<commit_message>
some progress on ppt
</commit_message>
<xml_diff>
--- a/loan_approval_slides_gm.pptx
+++ b/loan_approval_slides_gm.pptx
@@ -1,22 +1,117 @@
 
 <file path=ppt/presentation.xml><?xml version="1.0" encoding="utf-8"?>
-<p:presentation xmlns:a="http://schemas.openxmlformats.org/drawingml/2006/main" xmlns:p="http://schemas.openxmlformats.org/presentationml/2006/main" xmlns:r="http://schemas.openxmlformats.org/officeDocument/2006/relationships" xmlns:p14="http://schemas.microsoft.com/office/powerpoint/2010/main" xmlns:p15="http://schemas.microsoft.com/office/powerpoint/2012/main" xmlns:mc="http://schemas.openxmlformats.org/markup-compatibility/2006">
+<p:presentation xmlns:a="http://schemas.openxmlformats.org/drawingml/2006/main" xmlns:r="http://schemas.openxmlformats.org/officeDocument/2006/relationships" xmlns:p="http://schemas.openxmlformats.org/presentationml/2006/main">
   <p:sldMasterIdLst>
-    <p:sldMasterId id="2147483648" r:id="rId2"/>
+    <p:sldMasterId id="2147483648" r:id="rId1"/>
   </p:sldMasterIdLst>
   <p:sldIdLst>
-    <p:sldId id="256" r:id="rId3"/>
-    <p:sldId id="257" r:id="rId4"/>
-    <p:sldId id="258" r:id="rId5"/>
-    <p:sldId id="259" r:id="rId6"/>
+    <p:sldId id="256" r:id="rId2"/>
+    <p:sldId id="257" r:id="rId3"/>
+    <p:sldId id="258" r:id="rId4"/>
+    <p:sldId id="259" r:id="rId5"/>
   </p:sldIdLst>
   <p:sldSz cx="10080625" cy="5670550"/>
   <p:notesSz cx="7772400" cy="10058400"/>
+  <p:defaultTextStyle>
+    <a:defPPr>
+      <a:defRPr lang="en-US"/>
+    </a:defPPr>
+    <a:lvl1pPr marL="0" algn="l" defTabSz="914400" rtl="0" eaLnBrk="1" latinLnBrk="0" hangingPunct="1">
+      <a:defRPr sz="1800" kern="1200">
+        <a:solidFill>
+          <a:schemeClr val="tx1"/>
+        </a:solidFill>
+        <a:latin typeface="+mn-lt"/>
+        <a:ea typeface="+mn-ea"/>
+        <a:cs typeface="+mn-cs"/>
+      </a:defRPr>
+    </a:lvl1pPr>
+    <a:lvl2pPr marL="457200" algn="l" defTabSz="914400" rtl="0" eaLnBrk="1" latinLnBrk="0" hangingPunct="1">
+      <a:defRPr sz="1800" kern="1200">
+        <a:solidFill>
+          <a:schemeClr val="tx1"/>
+        </a:solidFill>
+        <a:latin typeface="+mn-lt"/>
+        <a:ea typeface="+mn-ea"/>
+        <a:cs typeface="+mn-cs"/>
+      </a:defRPr>
+    </a:lvl2pPr>
+    <a:lvl3pPr marL="914400" algn="l" defTabSz="914400" rtl="0" eaLnBrk="1" latinLnBrk="0" hangingPunct="1">
+      <a:defRPr sz="1800" kern="1200">
+        <a:solidFill>
+          <a:schemeClr val="tx1"/>
+        </a:solidFill>
+        <a:latin typeface="+mn-lt"/>
+        <a:ea typeface="+mn-ea"/>
+        <a:cs typeface="+mn-cs"/>
+      </a:defRPr>
+    </a:lvl3pPr>
+    <a:lvl4pPr marL="1371600" algn="l" defTabSz="914400" rtl="0" eaLnBrk="1" latinLnBrk="0" hangingPunct="1">
+      <a:defRPr sz="1800" kern="1200">
+        <a:solidFill>
+          <a:schemeClr val="tx1"/>
+        </a:solidFill>
+        <a:latin typeface="+mn-lt"/>
+        <a:ea typeface="+mn-ea"/>
+        <a:cs typeface="+mn-cs"/>
+      </a:defRPr>
+    </a:lvl4pPr>
+    <a:lvl5pPr marL="1828800" algn="l" defTabSz="914400" rtl="0" eaLnBrk="1" latinLnBrk="0" hangingPunct="1">
+      <a:defRPr sz="1800" kern="1200">
+        <a:solidFill>
+          <a:schemeClr val="tx1"/>
+        </a:solidFill>
+        <a:latin typeface="+mn-lt"/>
+        <a:ea typeface="+mn-ea"/>
+        <a:cs typeface="+mn-cs"/>
+      </a:defRPr>
+    </a:lvl5pPr>
+    <a:lvl6pPr marL="2286000" algn="l" defTabSz="914400" rtl="0" eaLnBrk="1" latinLnBrk="0" hangingPunct="1">
+      <a:defRPr sz="1800" kern="1200">
+        <a:solidFill>
+          <a:schemeClr val="tx1"/>
+        </a:solidFill>
+        <a:latin typeface="+mn-lt"/>
+        <a:ea typeface="+mn-ea"/>
+        <a:cs typeface="+mn-cs"/>
+      </a:defRPr>
+    </a:lvl6pPr>
+    <a:lvl7pPr marL="2743200" algn="l" defTabSz="914400" rtl="0" eaLnBrk="1" latinLnBrk="0" hangingPunct="1">
+      <a:defRPr sz="1800" kern="1200">
+        <a:solidFill>
+          <a:schemeClr val="tx1"/>
+        </a:solidFill>
+        <a:latin typeface="+mn-lt"/>
+        <a:ea typeface="+mn-ea"/>
+        <a:cs typeface="+mn-cs"/>
+      </a:defRPr>
+    </a:lvl7pPr>
+    <a:lvl8pPr marL="3200400" algn="l" defTabSz="914400" rtl="0" eaLnBrk="1" latinLnBrk="0" hangingPunct="1">
+      <a:defRPr sz="1800" kern="1200">
+        <a:solidFill>
+          <a:schemeClr val="tx1"/>
+        </a:solidFill>
+        <a:latin typeface="+mn-lt"/>
+        <a:ea typeface="+mn-ea"/>
+        <a:cs typeface="+mn-cs"/>
+      </a:defRPr>
+    </a:lvl8pPr>
+    <a:lvl9pPr marL="3657600" algn="l" defTabSz="914400" rtl="0" eaLnBrk="1" latinLnBrk="0" hangingPunct="1">
+      <a:defRPr sz="1800" kern="1200">
+        <a:solidFill>
+          <a:schemeClr val="tx1"/>
+        </a:solidFill>
+        <a:latin typeface="+mn-lt"/>
+        <a:ea typeface="+mn-ea"/>
+        <a:cs typeface="+mn-cs"/>
+      </a:defRPr>
+    </a:lvl9pPr>
+  </p:defaultTextStyle>
 </p:presentation>
 </file>
 
 <file path=ppt/slideLayouts/slideLayout1.xml><?xml version="1.0" encoding="utf-8"?>
-<p:sldLayout xmlns:a="http://schemas.openxmlformats.org/drawingml/2006/main" xmlns:p="http://schemas.openxmlformats.org/presentationml/2006/main" xmlns:r="http://schemas.openxmlformats.org/officeDocument/2006/relationships" xmlns:p14="http://schemas.microsoft.com/office/powerpoint/2010/main" xmlns:p15="http://schemas.microsoft.com/office/powerpoint/2012/main" xmlns:mc="http://schemas.openxmlformats.org/markup-compatibility/2006" type="blank" preserve="1">
+<p:sldLayout xmlns:a="http://schemas.openxmlformats.org/drawingml/2006/main" xmlns:r="http://schemas.openxmlformats.org/officeDocument/2006/relationships" xmlns:p="http://schemas.openxmlformats.org/presentationml/2006/main" type="blank" preserve="1">
   <p:cSld name="Blank Slide">
     <p:spTree>
       <p:nvGrpSpPr>
@@ -45,6 +140,7 @@
         <p:spPr/>
         <p:txBody>
           <a:bodyPr/>
+          <a:lstStyle/>
           <a:p>
             <a:r>
               <a:t>Footer</a:t>
@@ -65,10 +161,12 @@
         <p:spPr/>
         <p:txBody>
           <a:bodyPr/>
+          <a:lstStyle/>
           <a:p>
             <a:fld id="{FF9B7324-C46D-4B82-810B-EA3D95BFC327}" type="slidenum">
-              <a:t>&lt;#&gt;</a:t>
+              <a:t>‹#›</a:t>
             </a:fld>
+            <a:endParaRPr/>
           </a:p>
         </p:txBody>
       </p:sp>
@@ -85,21 +183,22 @@
         <p:spPr/>
         <p:txBody>
           <a:bodyPr/>
-          <a:p>
-            <a:r>
-              <a:rPr lang="en-CA"/>
-              <a:t/>
-            </a:r>
+          <a:lstStyle/>
+          <a:p>
+            <a:endParaRPr/>
           </a:p>
         </p:txBody>
       </p:sp>
     </p:spTree>
   </p:cSld>
+  <p:clrMapOvr>
+    <a:masterClrMapping/>
+  </p:clrMapOvr>
 </p:sldLayout>
 </file>
 
 <file path=ppt/slideLayouts/slideLayout10.xml><?xml version="1.0" encoding="utf-8"?>
-<p:sldLayout xmlns:a="http://schemas.openxmlformats.org/drawingml/2006/main" xmlns:p="http://schemas.openxmlformats.org/presentationml/2006/main" xmlns:r="http://schemas.openxmlformats.org/officeDocument/2006/relationships" xmlns:p14="http://schemas.microsoft.com/office/powerpoint/2010/main" xmlns:p15="http://schemas.microsoft.com/office/powerpoint/2012/main" xmlns:mc="http://schemas.openxmlformats.org/markup-compatibility/2006" type="objOverTx" preserve="1">
+<p:sldLayout xmlns:a="http://schemas.openxmlformats.org/drawingml/2006/main" xmlns:r="http://schemas.openxmlformats.org/officeDocument/2006/relationships" xmlns:p="http://schemas.openxmlformats.org/presentationml/2006/main" type="objOverTx" preserve="1">
   <p:cSld name="Title, Content over Content">
     <p:spTree>
       <p:nvGrpSpPr>
@@ -139,14 +238,15 @@
           </a:ln>
         </p:spPr>
         <p:txBody>
-          <a:bodyPr lIns="0" rIns="0" tIns="0" bIns="0" anchor="ctr">
+          <a:bodyPr lIns="0" tIns="0" rIns="0" bIns="0" anchor="ctr">
             <a:noAutofit/>
           </a:bodyPr>
+          <a:lstStyle/>
           <a:p>
             <a:pPr algn="ctr">
               <a:buNone/>
             </a:pPr>
-            <a:endParaRPr b="0" lang="en-CA" sz="4400" spc="-1" strike="noStrike">
+            <a:endParaRPr lang="en-CA" sz="4400" b="0" strike="noStrike" spc="-1">
               <a:latin typeface="Arial"/>
             </a:endParaRPr>
           </a:p>
@@ -176,11 +276,12 @@
           </a:ln>
         </p:spPr>
         <p:txBody>
-          <a:bodyPr lIns="0" rIns="0" tIns="0" bIns="0" anchor="t">
+          <a:bodyPr lIns="0" tIns="0" rIns="0" bIns="0" anchor="t">
             <a:normAutofit/>
           </a:bodyPr>
-          <a:p>
-            <a:endParaRPr b="0" lang="en-CA" sz="3200" spc="-1" strike="noStrike">
+          <a:lstStyle/>
+          <a:p>
+            <a:endParaRPr lang="en-CA" sz="3200" b="0" strike="noStrike" spc="-1">
               <a:latin typeface="Arial"/>
             </a:endParaRPr>
           </a:p>
@@ -210,11 +311,12 @@
           </a:ln>
         </p:spPr>
         <p:txBody>
-          <a:bodyPr lIns="0" rIns="0" tIns="0" bIns="0" anchor="t">
+          <a:bodyPr lIns="0" tIns="0" rIns="0" bIns="0" anchor="t">
             <a:normAutofit/>
           </a:bodyPr>
-          <a:p>
-            <a:endParaRPr b="0" lang="en-CA" sz="3200" spc="-1" strike="noStrike">
+          <a:lstStyle/>
+          <a:p>
+            <a:endParaRPr lang="en-CA" sz="3200" b="0" strike="noStrike" spc="-1">
               <a:latin typeface="Arial"/>
             </a:endParaRPr>
           </a:p>
@@ -233,6 +335,7 @@
         <p:spPr/>
         <p:txBody>
           <a:bodyPr/>
+          <a:lstStyle/>
           <a:p>
             <a:r>
               <a:t>Footer</a:t>
@@ -253,10 +356,12 @@
         <p:spPr/>
         <p:txBody>
           <a:bodyPr/>
+          <a:lstStyle/>
           <a:p>
             <a:fld id="{879F603A-DB40-4290-B940-BE2D778F074E}" type="slidenum">
-              <a:t>&lt;#&gt;</a:t>
+              <a:t>‹#›</a:t>
             </a:fld>
+            <a:endParaRPr/>
           </a:p>
         </p:txBody>
       </p:sp>
@@ -273,21 +378,22 @@
         <p:spPr/>
         <p:txBody>
           <a:bodyPr/>
-          <a:p>
-            <a:r>
-              <a:rPr lang="en-CA"/>
-              <a:t/>
-            </a:r>
+          <a:lstStyle/>
+          <a:p>
+            <a:endParaRPr/>
           </a:p>
         </p:txBody>
       </p:sp>
     </p:spTree>
   </p:cSld>
+  <p:clrMapOvr>
+    <a:masterClrMapping/>
+  </p:clrMapOvr>
 </p:sldLayout>
 </file>
 
 <file path=ppt/slideLayouts/slideLayout11.xml><?xml version="1.0" encoding="utf-8"?>
-<p:sldLayout xmlns:a="http://schemas.openxmlformats.org/drawingml/2006/main" xmlns:p="http://schemas.openxmlformats.org/presentationml/2006/main" xmlns:r="http://schemas.openxmlformats.org/officeDocument/2006/relationships" xmlns:p14="http://schemas.microsoft.com/office/powerpoint/2010/main" xmlns:p15="http://schemas.microsoft.com/office/powerpoint/2012/main" xmlns:mc="http://schemas.openxmlformats.org/markup-compatibility/2006" type="fourObj" preserve="1">
+<p:sldLayout xmlns:a="http://schemas.openxmlformats.org/drawingml/2006/main" xmlns:r="http://schemas.openxmlformats.org/officeDocument/2006/relationships" xmlns:p="http://schemas.openxmlformats.org/presentationml/2006/main" type="fourObj" preserve="1">
   <p:cSld name="Title, 4 Content">
     <p:spTree>
       <p:nvGrpSpPr>
@@ -327,14 +433,15 @@
           </a:ln>
         </p:spPr>
         <p:txBody>
-          <a:bodyPr lIns="0" rIns="0" tIns="0" bIns="0" anchor="ctr">
+          <a:bodyPr lIns="0" tIns="0" rIns="0" bIns="0" anchor="ctr">
             <a:noAutofit/>
           </a:bodyPr>
+          <a:lstStyle/>
           <a:p>
             <a:pPr algn="ctr">
               <a:buNone/>
             </a:pPr>
-            <a:endParaRPr b="0" lang="en-CA" sz="4400" spc="-1" strike="noStrike">
+            <a:endParaRPr lang="en-CA" sz="4400" b="0" strike="noStrike" spc="-1">
               <a:latin typeface="Arial"/>
             </a:endParaRPr>
           </a:p>
@@ -364,11 +471,12 @@
           </a:ln>
         </p:spPr>
         <p:txBody>
-          <a:bodyPr lIns="0" rIns="0" tIns="0" bIns="0" anchor="t">
+          <a:bodyPr lIns="0" tIns="0" rIns="0" bIns="0" anchor="t">
             <a:normAutofit/>
           </a:bodyPr>
-          <a:p>
-            <a:endParaRPr b="0" lang="en-CA" sz="3200" spc="-1" strike="noStrike">
+          <a:lstStyle/>
+          <a:p>
+            <a:endParaRPr lang="en-CA" sz="3200" b="0" strike="noStrike" spc="-1">
               <a:latin typeface="Arial"/>
             </a:endParaRPr>
           </a:p>
@@ -398,11 +506,12 @@
           </a:ln>
         </p:spPr>
         <p:txBody>
-          <a:bodyPr lIns="0" rIns="0" tIns="0" bIns="0" anchor="t">
+          <a:bodyPr lIns="0" tIns="0" rIns="0" bIns="0" anchor="t">
             <a:normAutofit/>
           </a:bodyPr>
-          <a:p>
-            <a:endParaRPr b="0" lang="en-CA" sz="3200" spc="-1" strike="noStrike">
+          <a:lstStyle/>
+          <a:p>
+            <a:endParaRPr lang="en-CA" sz="3200" b="0" strike="noStrike" spc="-1">
               <a:latin typeface="Arial"/>
             </a:endParaRPr>
           </a:p>
@@ -432,11 +541,12 @@
           </a:ln>
         </p:spPr>
         <p:txBody>
-          <a:bodyPr lIns="0" rIns="0" tIns="0" bIns="0" anchor="t">
+          <a:bodyPr lIns="0" tIns="0" rIns="0" bIns="0" anchor="t">
             <a:normAutofit/>
           </a:bodyPr>
-          <a:p>
-            <a:endParaRPr b="0" lang="en-CA" sz="3200" spc="-1" strike="noStrike">
+          <a:lstStyle/>
+          <a:p>
+            <a:endParaRPr lang="en-CA" sz="3200" b="0" strike="noStrike" spc="-1">
               <a:latin typeface="Arial"/>
             </a:endParaRPr>
           </a:p>
@@ -466,11 +576,12 @@
           </a:ln>
         </p:spPr>
         <p:txBody>
-          <a:bodyPr lIns="0" rIns="0" tIns="0" bIns="0" anchor="t">
+          <a:bodyPr lIns="0" tIns="0" rIns="0" bIns="0" anchor="t">
             <a:normAutofit/>
           </a:bodyPr>
-          <a:p>
-            <a:endParaRPr b="0" lang="en-CA" sz="3200" spc="-1" strike="noStrike">
+          <a:lstStyle/>
+          <a:p>
+            <a:endParaRPr lang="en-CA" sz="3200" b="0" strike="noStrike" spc="-1">
               <a:latin typeface="Arial"/>
             </a:endParaRPr>
           </a:p>
@@ -489,6 +600,7 @@
         <p:spPr/>
         <p:txBody>
           <a:bodyPr/>
+          <a:lstStyle/>
           <a:p>
             <a:r>
               <a:t>Footer</a:t>
@@ -509,10 +621,12 @@
         <p:spPr/>
         <p:txBody>
           <a:bodyPr/>
+          <a:lstStyle/>
           <a:p>
             <a:fld id="{ED0A0DD8-093F-45F8-80AC-B90CB727611A}" type="slidenum">
-              <a:t>&lt;#&gt;</a:t>
+              <a:t>‹#›</a:t>
             </a:fld>
+            <a:endParaRPr/>
           </a:p>
         </p:txBody>
       </p:sp>
@@ -529,21 +643,22 @@
         <p:spPr/>
         <p:txBody>
           <a:bodyPr/>
-          <a:p>
-            <a:r>
-              <a:rPr lang="en-CA"/>
-              <a:t/>
-            </a:r>
+          <a:lstStyle/>
+          <a:p>
+            <a:endParaRPr/>
           </a:p>
         </p:txBody>
       </p:sp>
     </p:spTree>
   </p:cSld>
+  <p:clrMapOvr>
+    <a:masterClrMapping/>
+  </p:clrMapOvr>
 </p:sldLayout>
 </file>
 
 <file path=ppt/slideLayouts/slideLayout12.xml><?xml version="1.0" encoding="utf-8"?>
-<p:sldLayout xmlns:a="http://schemas.openxmlformats.org/drawingml/2006/main" xmlns:p="http://schemas.openxmlformats.org/presentationml/2006/main" xmlns:r="http://schemas.openxmlformats.org/officeDocument/2006/relationships" xmlns:p14="http://schemas.microsoft.com/office/powerpoint/2010/main" xmlns:p15="http://schemas.microsoft.com/office/powerpoint/2012/main" xmlns:mc="http://schemas.openxmlformats.org/markup-compatibility/2006" type="blank" preserve="1">
+<p:sldLayout xmlns:a="http://schemas.openxmlformats.org/drawingml/2006/main" xmlns:r="http://schemas.openxmlformats.org/officeDocument/2006/relationships" xmlns:p="http://schemas.openxmlformats.org/presentationml/2006/main" type="blank" preserve="1">
   <p:cSld name="Title, 6 Content">
     <p:spTree>
       <p:nvGrpSpPr>
@@ -583,14 +698,15 @@
           </a:ln>
         </p:spPr>
         <p:txBody>
-          <a:bodyPr lIns="0" rIns="0" tIns="0" bIns="0" anchor="ctr">
+          <a:bodyPr lIns="0" tIns="0" rIns="0" bIns="0" anchor="ctr">
             <a:noAutofit/>
           </a:bodyPr>
+          <a:lstStyle/>
           <a:p>
             <a:pPr algn="ctr">
               <a:buNone/>
             </a:pPr>
-            <a:endParaRPr b="0" lang="en-CA" sz="4400" spc="-1" strike="noStrike">
+            <a:endParaRPr lang="en-CA" sz="4400" b="0" strike="noStrike" spc="-1">
               <a:latin typeface="Arial"/>
             </a:endParaRPr>
           </a:p>
@@ -620,11 +736,12 @@
           </a:ln>
         </p:spPr>
         <p:txBody>
-          <a:bodyPr lIns="0" rIns="0" tIns="0" bIns="0" anchor="t">
+          <a:bodyPr lIns="0" tIns="0" rIns="0" bIns="0" anchor="t">
             <a:normAutofit/>
           </a:bodyPr>
-          <a:p>
-            <a:endParaRPr b="0" lang="en-CA" sz="3200" spc="-1" strike="noStrike">
+          <a:lstStyle/>
+          <a:p>
+            <a:endParaRPr lang="en-CA" sz="3200" b="0" strike="noStrike" spc="-1">
               <a:latin typeface="Arial"/>
             </a:endParaRPr>
           </a:p>
@@ -654,11 +771,12 @@
           </a:ln>
         </p:spPr>
         <p:txBody>
-          <a:bodyPr lIns="0" rIns="0" tIns="0" bIns="0" anchor="t">
+          <a:bodyPr lIns="0" tIns="0" rIns="0" bIns="0" anchor="t">
             <a:normAutofit/>
           </a:bodyPr>
-          <a:p>
-            <a:endParaRPr b="0" lang="en-CA" sz="3200" spc="-1" strike="noStrike">
+          <a:lstStyle/>
+          <a:p>
+            <a:endParaRPr lang="en-CA" sz="3200" b="0" strike="noStrike" spc="-1">
               <a:latin typeface="Arial"/>
             </a:endParaRPr>
           </a:p>
@@ -688,11 +806,12 @@
           </a:ln>
         </p:spPr>
         <p:txBody>
-          <a:bodyPr lIns="0" rIns="0" tIns="0" bIns="0" anchor="t">
+          <a:bodyPr lIns="0" tIns="0" rIns="0" bIns="0" anchor="t">
             <a:normAutofit/>
           </a:bodyPr>
-          <a:p>
-            <a:endParaRPr b="0" lang="en-CA" sz="3200" spc="-1" strike="noStrike">
+          <a:lstStyle/>
+          <a:p>
+            <a:endParaRPr lang="en-CA" sz="3200" b="0" strike="noStrike" spc="-1">
               <a:latin typeface="Arial"/>
             </a:endParaRPr>
           </a:p>
@@ -722,11 +841,12 @@
           </a:ln>
         </p:spPr>
         <p:txBody>
-          <a:bodyPr lIns="0" rIns="0" tIns="0" bIns="0" anchor="t">
+          <a:bodyPr lIns="0" tIns="0" rIns="0" bIns="0" anchor="t">
             <a:normAutofit/>
           </a:bodyPr>
-          <a:p>
-            <a:endParaRPr b="0" lang="en-CA" sz="3200" spc="-1" strike="noStrike">
+          <a:lstStyle/>
+          <a:p>
+            <a:endParaRPr lang="en-CA" sz="3200" b="0" strike="noStrike" spc="-1">
               <a:latin typeface="Arial"/>
             </a:endParaRPr>
           </a:p>
@@ -756,11 +876,12 @@
           </a:ln>
         </p:spPr>
         <p:txBody>
-          <a:bodyPr lIns="0" rIns="0" tIns="0" bIns="0" anchor="t">
+          <a:bodyPr lIns="0" tIns="0" rIns="0" bIns="0" anchor="t">
             <a:normAutofit/>
           </a:bodyPr>
-          <a:p>
-            <a:endParaRPr b="0" lang="en-CA" sz="3200" spc="-1" strike="noStrike">
+          <a:lstStyle/>
+          <a:p>
+            <a:endParaRPr lang="en-CA" sz="3200" b="0" strike="noStrike" spc="-1">
               <a:latin typeface="Arial"/>
             </a:endParaRPr>
           </a:p>
@@ -790,11 +911,12 @@
           </a:ln>
         </p:spPr>
         <p:txBody>
-          <a:bodyPr lIns="0" rIns="0" tIns="0" bIns="0" anchor="t">
+          <a:bodyPr lIns="0" tIns="0" rIns="0" bIns="0" anchor="t">
             <a:normAutofit/>
           </a:bodyPr>
-          <a:p>
-            <a:endParaRPr b="0" lang="en-CA" sz="3200" spc="-1" strike="noStrike">
+          <a:lstStyle/>
+          <a:p>
+            <a:endParaRPr lang="en-CA" sz="3200" b="0" strike="noStrike" spc="-1">
               <a:latin typeface="Arial"/>
             </a:endParaRPr>
           </a:p>
@@ -813,6 +935,7 @@
         <p:spPr/>
         <p:txBody>
           <a:bodyPr/>
+          <a:lstStyle/>
           <a:p>
             <a:r>
               <a:t>Footer</a:t>
@@ -833,10 +956,12 @@
         <p:spPr/>
         <p:txBody>
           <a:bodyPr/>
+          <a:lstStyle/>
           <a:p>
             <a:fld id="{BA57B452-B26A-493F-8280-10655FC6F452}" type="slidenum">
-              <a:t>&lt;#&gt;</a:t>
+              <a:t>‹#›</a:t>
             </a:fld>
+            <a:endParaRPr/>
           </a:p>
         </p:txBody>
       </p:sp>
@@ -853,21 +978,22 @@
         <p:spPr/>
         <p:txBody>
           <a:bodyPr/>
-          <a:p>
-            <a:r>
-              <a:rPr lang="en-CA"/>
-              <a:t/>
-            </a:r>
+          <a:lstStyle/>
+          <a:p>
+            <a:endParaRPr/>
           </a:p>
         </p:txBody>
       </p:sp>
     </p:spTree>
   </p:cSld>
+  <p:clrMapOvr>
+    <a:masterClrMapping/>
+  </p:clrMapOvr>
 </p:sldLayout>
 </file>
 
 <file path=ppt/slideLayouts/slideLayout2.xml><?xml version="1.0" encoding="utf-8"?>
-<p:sldLayout xmlns:a="http://schemas.openxmlformats.org/drawingml/2006/main" xmlns:p="http://schemas.openxmlformats.org/presentationml/2006/main" xmlns:r="http://schemas.openxmlformats.org/officeDocument/2006/relationships" xmlns:p14="http://schemas.microsoft.com/office/powerpoint/2010/main" xmlns:p15="http://schemas.microsoft.com/office/powerpoint/2012/main" xmlns:mc="http://schemas.openxmlformats.org/markup-compatibility/2006" type="tx" preserve="1">
+<p:sldLayout xmlns:a="http://schemas.openxmlformats.org/drawingml/2006/main" xmlns:r="http://schemas.openxmlformats.org/officeDocument/2006/relationships" xmlns:p="http://schemas.openxmlformats.org/presentationml/2006/main" type="tx" preserve="1">
   <p:cSld name="Title Slide">
     <p:spTree>
       <p:nvGrpSpPr>
@@ -907,14 +1033,15 @@
           </a:ln>
         </p:spPr>
         <p:txBody>
-          <a:bodyPr lIns="0" rIns="0" tIns="0" bIns="0" anchor="ctr">
+          <a:bodyPr lIns="0" tIns="0" rIns="0" bIns="0" anchor="ctr">
             <a:noAutofit/>
           </a:bodyPr>
+          <a:lstStyle/>
           <a:p>
             <a:pPr algn="ctr">
               <a:buNone/>
             </a:pPr>
-            <a:endParaRPr b="0" lang="en-CA" sz="4400" spc="-1" strike="noStrike">
+            <a:endParaRPr lang="en-CA" sz="4400" b="0" strike="noStrike" spc="-1">
               <a:latin typeface="Arial"/>
             </a:endParaRPr>
           </a:p>
@@ -944,14 +1071,15 @@
           </a:ln>
         </p:spPr>
         <p:txBody>
-          <a:bodyPr lIns="0" rIns="0" tIns="0" bIns="0" anchor="ctr">
+          <a:bodyPr lIns="0" tIns="0" rIns="0" bIns="0" anchor="ctr">
             <a:noAutofit/>
           </a:bodyPr>
+          <a:lstStyle/>
           <a:p>
             <a:pPr algn="ctr">
               <a:buNone/>
             </a:pPr>
-            <a:endParaRPr b="0" lang="en-CA" sz="3200" spc="-1" strike="noStrike">
+            <a:endParaRPr lang="en-CA" sz="3200" b="0" strike="noStrike" spc="-1">
               <a:latin typeface="Arial"/>
             </a:endParaRPr>
           </a:p>
@@ -970,6 +1098,7 @@
         <p:spPr/>
         <p:txBody>
           <a:bodyPr/>
+          <a:lstStyle/>
           <a:p>
             <a:r>
               <a:t>Footer</a:t>
@@ -979,7 +1108,7 @@
       </p:sp>
       <p:sp>
         <p:nvSpPr>
-          <p:cNvPr id="5" name="PlaceHolder 4"/>
+          <p:cNvPr id="2" name="PlaceHolder 4"/>
           <p:cNvSpPr>
             <a:spLocks noGrp="1"/>
           </p:cNvSpPr>
@@ -990,16 +1119,18 @@
         <p:spPr/>
         <p:txBody>
           <a:bodyPr/>
+          <a:lstStyle/>
           <a:p>
             <a:fld id="{D926AE22-92C2-498D-9B38-3C321AC1AC46}" type="slidenum">
-              <a:t>&lt;#&gt;</a:t>
+              <a:t>‹#›</a:t>
             </a:fld>
-          </a:p>
-        </p:txBody>
-      </p:sp>
-      <p:sp>
-        <p:nvSpPr>
-          <p:cNvPr id="6" name="PlaceHolder 5"/>
+            <a:endParaRPr/>
+          </a:p>
+        </p:txBody>
+      </p:sp>
+      <p:sp>
+        <p:nvSpPr>
+          <p:cNvPr id="3" name="PlaceHolder 5"/>
           <p:cNvSpPr>
             <a:spLocks noGrp="1"/>
           </p:cNvSpPr>
@@ -1010,21 +1141,22 @@
         <p:spPr/>
         <p:txBody>
           <a:bodyPr/>
-          <a:p>
-            <a:r>
-              <a:rPr lang="en-CA"/>
-              <a:t/>
-            </a:r>
+          <a:lstStyle/>
+          <a:p>
+            <a:endParaRPr/>
           </a:p>
         </p:txBody>
       </p:sp>
     </p:spTree>
   </p:cSld>
+  <p:clrMapOvr>
+    <a:masterClrMapping/>
+  </p:clrMapOvr>
 </p:sldLayout>
 </file>
 
 <file path=ppt/slideLayouts/slideLayout3.xml><?xml version="1.0" encoding="utf-8"?>
-<p:sldLayout xmlns:a="http://schemas.openxmlformats.org/drawingml/2006/main" xmlns:p="http://schemas.openxmlformats.org/presentationml/2006/main" xmlns:r="http://schemas.openxmlformats.org/officeDocument/2006/relationships" xmlns:p14="http://schemas.microsoft.com/office/powerpoint/2010/main" xmlns:p15="http://schemas.microsoft.com/office/powerpoint/2012/main" xmlns:mc="http://schemas.openxmlformats.org/markup-compatibility/2006" type="obj" preserve="1">
+<p:sldLayout xmlns:a="http://schemas.openxmlformats.org/drawingml/2006/main" xmlns:r="http://schemas.openxmlformats.org/officeDocument/2006/relationships" xmlns:p="http://schemas.openxmlformats.org/presentationml/2006/main" type="obj" preserve="1">
   <p:cSld name="Title, Content">
     <p:spTree>
       <p:nvGrpSpPr>
@@ -1064,14 +1196,15 @@
           </a:ln>
         </p:spPr>
         <p:txBody>
-          <a:bodyPr lIns="0" rIns="0" tIns="0" bIns="0" anchor="ctr">
+          <a:bodyPr lIns="0" tIns="0" rIns="0" bIns="0" anchor="ctr">
             <a:noAutofit/>
           </a:bodyPr>
+          <a:lstStyle/>
           <a:p>
             <a:pPr algn="ctr">
               <a:buNone/>
             </a:pPr>
-            <a:endParaRPr b="0" lang="en-CA" sz="4400" spc="-1" strike="noStrike">
+            <a:endParaRPr lang="en-CA" sz="4400" b="0" strike="noStrike" spc="-1">
               <a:latin typeface="Arial"/>
             </a:endParaRPr>
           </a:p>
@@ -1101,11 +1234,12 @@
           </a:ln>
         </p:spPr>
         <p:txBody>
-          <a:bodyPr lIns="0" rIns="0" tIns="0" bIns="0" anchor="t">
+          <a:bodyPr lIns="0" tIns="0" rIns="0" bIns="0" anchor="t">
             <a:normAutofit/>
           </a:bodyPr>
-          <a:p>
-            <a:endParaRPr b="0" lang="en-CA" sz="3200" spc="-1" strike="noStrike">
+          <a:lstStyle/>
+          <a:p>
+            <a:endParaRPr lang="en-CA" sz="3200" b="0" strike="noStrike" spc="-1">
               <a:latin typeface="Arial"/>
             </a:endParaRPr>
           </a:p>
@@ -1124,6 +1258,7 @@
         <p:spPr/>
         <p:txBody>
           <a:bodyPr/>
+          <a:lstStyle/>
           <a:p>
             <a:r>
               <a:t>Footer</a:t>
@@ -1144,10 +1279,12 @@
         <p:spPr/>
         <p:txBody>
           <a:bodyPr/>
+          <a:lstStyle/>
           <a:p>
             <a:fld id="{8A95000E-597B-4EC9-853C-9AF0A2161387}" type="slidenum">
-              <a:t>&lt;#&gt;</a:t>
+              <a:t>‹#›</a:t>
             </a:fld>
+            <a:endParaRPr/>
           </a:p>
         </p:txBody>
       </p:sp>
@@ -1164,21 +1301,22 @@
         <p:spPr/>
         <p:txBody>
           <a:bodyPr/>
-          <a:p>
-            <a:r>
-              <a:rPr lang="en-CA"/>
-              <a:t/>
-            </a:r>
+          <a:lstStyle/>
+          <a:p>
+            <a:endParaRPr/>
           </a:p>
         </p:txBody>
       </p:sp>
     </p:spTree>
   </p:cSld>
+  <p:clrMapOvr>
+    <a:masterClrMapping/>
+  </p:clrMapOvr>
 </p:sldLayout>
 </file>
 
 <file path=ppt/slideLayouts/slideLayout4.xml><?xml version="1.0" encoding="utf-8"?>
-<p:sldLayout xmlns:a="http://schemas.openxmlformats.org/drawingml/2006/main" xmlns:p="http://schemas.openxmlformats.org/presentationml/2006/main" xmlns:r="http://schemas.openxmlformats.org/officeDocument/2006/relationships" xmlns:p14="http://schemas.microsoft.com/office/powerpoint/2010/main" xmlns:p15="http://schemas.microsoft.com/office/powerpoint/2012/main" xmlns:mc="http://schemas.openxmlformats.org/markup-compatibility/2006" type="twoObj" preserve="1">
+<p:sldLayout xmlns:a="http://schemas.openxmlformats.org/drawingml/2006/main" xmlns:r="http://schemas.openxmlformats.org/officeDocument/2006/relationships" xmlns:p="http://schemas.openxmlformats.org/presentationml/2006/main" type="twoObj" preserve="1">
   <p:cSld name="Title, 2 Content">
     <p:spTree>
       <p:nvGrpSpPr>
@@ -1218,14 +1356,15 @@
           </a:ln>
         </p:spPr>
         <p:txBody>
-          <a:bodyPr lIns="0" rIns="0" tIns="0" bIns="0" anchor="ctr">
+          <a:bodyPr lIns="0" tIns="0" rIns="0" bIns="0" anchor="ctr">
             <a:noAutofit/>
           </a:bodyPr>
+          <a:lstStyle/>
           <a:p>
             <a:pPr algn="ctr">
               <a:buNone/>
             </a:pPr>
-            <a:endParaRPr b="0" lang="en-CA" sz="4400" spc="-1" strike="noStrike">
+            <a:endParaRPr lang="en-CA" sz="4400" b="0" strike="noStrike" spc="-1">
               <a:latin typeface="Arial"/>
             </a:endParaRPr>
           </a:p>
@@ -1255,11 +1394,12 @@
           </a:ln>
         </p:spPr>
         <p:txBody>
-          <a:bodyPr lIns="0" rIns="0" tIns="0" bIns="0" anchor="t">
+          <a:bodyPr lIns="0" tIns="0" rIns="0" bIns="0" anchor="t">
             <a:normAutofit/>
           </a:bodyPr>
-          <a:p>
-            <a:endParaRPr b="0" lang="en-CA" sz="3200" spc="-1" strike="noStrike">
+          <a:lstStyle/>
+          <a:p>
+            <a:endParaRPr lang="en-CA" sz="3200" b="0" strike="noStrike" spc="-1">
               <a:latin typeface="Arial"/>
             </a:endParaRPr>
           </a:p>
@@ -1289,11 +1429,12 @@
           </a:ln>
         </p:spPr>
         <p:txBody>
-          <a:bodyPr lIns="0" rIns="0" tIns="0" bIns="0" anchor="t">
+          <a:bodyPr lIns="0" tIns="0" rIns="0" bIns="0" anchor="t">
             <a:normAutofit/>
           </a:bodyPr>
-          <a:p>
-            <a:endParaRPr b="0" lang="en-CA" sz="3200" spc="-1" strike="noStrike">
+          <a:lstStyle/>
+          <a:p>
+            <a:endParaRPr lang="en-CA" sz="3200" b="0" strike="noStrike" spc="-1">
               <a:latin typeface="Arial"/>
             </a:endParaRPr>
           </a:p>
@@ -1312,6 +1453,7 @@
         <p:spPr/>
         <p:txBody>
           <a:bodyPr/>
+          <a:lstStyle/>
           <a:p>
             <a:r>
               <a:t>Footer</a:t>
@@ -1332,10 +1474,12 @@
         <p:spPr/>
         <p:txBody>
           <a:bodyPr/>
+          <a:lstStyle/>
           <a:p>
             <a:fld id="{957A0242-D773-4821-BD0D-AB8DD089FF39}" type="slidenum">
-              <a:t>&lt;#&gt;</a:t>
+              <a:t>‹#›</a:t>
             </a:fld>
+            <a:endParaRPr/>
           </a:p>
         </p:txBody>
       </p:sp>
@@ -1352,21 +1496,22 @@
         <p:spPr/>
         <p:txBody>
           <a:bodyPr/>
-          <a:p>
-            <a:r>
-              <a:rPr lang="en-CA"/>
-              <a:t/>
-            </a:r>
+          <a:lstStyle/>
+          <a:p>
+            <a:endParaRPr/>
           </a:p>
         </p:txBody>
       </p:sp>
     </p:spTree>
   </p:cSld>
+  <p:clrMapOvr>
+    <a:masterClrMapping/>
+  </p:clrMapOvr>
 </p:sldLayout>
 </file>
 
 <file path=ppt/slideLayouts/slideLayout5.xml><?xml version="1.0" encoding="utf-8"?>
-<p:sldLayout xmlns:a="http://schemas.openxmlformats.org/drawingml/2006/main" xmlns:p="http://schemas.openxmlformats.org/presentationml/2006/main" xmlns:r="http://schemas.openxmlformats.org/officeDocument/2006/relationships" xmlns:p14="http://schemas.microsoft.com/office/powerpoint/2010/main" xmlns:p15="http://schemas.microsoft.com/office/powerpoint/2012/main" xmlns:mc="http://schemas.openxmlformats.org/markup-compatibility/2006" type="titleOnly" preserve="1">
+<p:sldLayout xmlns:a="http://schemas.openxmlformats.org/drawingml/2006/main" xmlns:r="http://schemas.openxmlformats.org/officeDocument/2006/relationships" xmlns:p="http://schemas.openxmlformats.org/presentationml/2006/main" type="titleOnly" preserve="1">
   <p:cSld name="Title Only">
     <p:spTree>
       <p:nvGrpSpPr>
@@ -1406,14 +1551,15 @@
           </a:ln>
         </p:spPr>
         <p:txBody>
-          <a:bodyPr lIns="0" rIns="0" tIns="0" bIns="0" anchor="ctr">
+          <a:bodyPr lIns="0" tIns="0" rIns="0" bIns="0" anchor="ctr">
             <a:noAutofit/>
           </a:bodyPr>
+          <a:lstStyle/>
           <a:p>
             <a:pPr algn="ctr">
               <a:buNone/>
             </a:pPr>
-            <a:endParaRPr b="0" lang="en-CA" sz="4400" spc="-1" strike="noStrike">
+            <a:endParaRPr lang="en-CA" sz="4400" b="0" strike="noStrike" spc="-1">
               <a:latin typeface="Arial"/>
             </a:endParaRPr>
           </a:p>
@@ -1432,6 +1578,7 @@
         <p:spPr/>
         <p:txBody>
           <a:bodyPr/>
+          <a:lstStyle/>
           <a:p>
             <a:r>
               <a:t>Footer</a:t>
@@ -1452,10 +1599,12 @@
         <p:spPr/>
         <p:txBody>
           <a:bodyPr/>
+          <a:lstStyle/>
           <a:p>
             <a:fld id="{B72F7AF8-209F-45B3-B5B5-DBC48D5250C1}" type="slidenum">
-              <a:t>&lt;#&gt;</a:t>
+              <a:t>‹#›</a:t>
             </a:fld>
+            <a:endParaRPr/>
           </a:p>
         </p:txBody>
       </p:sp>
@@ -1472,21 +1621,22 @@
         <p:spPr/>
         <p:txBody>
           <a:bodyPr/>
-          <a:p>
-            <a:r>
-              <a:rPr lang="en-CA"/>
-              <a:t/>
-            </a:r>
+          <a:lstStyle/>
+          <a:p>
+            <a:endParaRPr/>
           </a:p>
         </p:txBody>
       </p:sp>
     </p:spTree>
   </p:cSld>
+  <p:clrMapOvr>
+    <a:masterClrMapping/>
+  </p:clrMapOvr>
 </p:sldLayout>
 </file>
 
 <file path=ppt/slideLayouts/slideLayout6.xml><?xml version="1.0" encoding="utf-8"?>
-<p:sldLayout xmlns:a="http://schemas.openxmlformats.org/drawingml/2006/main" xmlns:p="http://schemas.openxmlformats.org/presentationml/2006/main" xmlns:r="http://schemas.openxmlformats.org/officeDocument/2006/relationships" xmlns:p14="http://schemas.microsoft.com/office/powerpoint/2010/main" xmlns:p15="http://schemas.microsoft.com/office/powerpoint/2012/main" xmlns:mc="http://schemas.openxmlformats.org/markup-compatibility/2006" type="objOnly" preserve="1">
+<p:sldLayout xmlns:a="http://schemas.openxmlformats.org/drawingml/2006/main" xmlns:r="http://schemas.openxmlformats.org/officeDocument/2006/relationships" xmlns:p="http://schemas.openxmlformats.org/presentationml/2006/main" type="objOnly" preserve="1">
   <p:cSld name="Centered Text">
     <p:spTree>
       <p:nvGrpSpPr>
@@ -1526,14 +1676,15 @@
           </a:ln>
         </p:spPr>
         <p:txBody>
-          <a:bodyPr lIns="0" rIns="0" tIns="0" bIns="0" anchor="ctr">
+          <a:bodyPr lIns="0" tIns="0" rIns="0" bIns="0" anchor="ctr">
             <a:noAutofit/>
           </a:bodyPr>
+          <a:lstStyle/>
           <a:p>
             <a:pPr algn="ctr">
               <a:buNone/>
             </a:pPr>
-            <a:endParaRPr b="0" lang="en-CA" sz="3200" spc="-1" strike="noStrike">
+            <a:endParaRPr lang="en-CA" sz="3200" b="0" strike="noStrike" spc="-1">
               <a:latin typeface="Arial"/>
             </a:endParaRPr>
           </a:p>
@@ -1552,6 +1703,7 @@
         <p:spPr/>
         <p:txBody>
           <a:bodyPr/>
+          <a:lstStyle/>
           <a:p>
             <a:r>
               <a:t>Footer</a:t>
@@ -1572,10 +1724,12 @@
         <p:spPr/>
         <p:txBody>
           <a:bodyPr/>
+          <a:lstStyle/>
           <a:p>
             <a:fld id="{C2271EC6-60A2-499E-BB53-C8F5C32334F4}" type="slidenum">
-              <a:t>&lt;#&gt;</a:t>
+              <a:t>‹#›</a:t>
             </a:fld>
+            <a:endParaRPr/>
           </a:p>
         </p:txBody>
       </p:sp>
@@ -1592,21 +1746,22 @@
         <p:spPr/>
         <p:txBody>
           <a:bodyPr/>
-          <a:p>
-            <a:r>
-              <a:rPr lang="en-CA"/>
-              <a:t/>
-            </a:r>
+          <a:lstStyle/>
+          <a:p>
+            <a:endParaRPr/>
           </a:p>
         </p:txBody>
       </p:sp>
     </p:spTree>
   </p:cSld>
+  <p:clrMapOvr>
+    <a:masterClrMapping/>
+  </p:clrMapOvr>
 </p:sldLayout>
 </file>
 
 <file path=ppt/slideLayouts/slideLayout7.xml><?xml version="1.0" encoding="utf-8"?>
-<p:sldLayout xmlns:a="http://schemas.openxmlformats.org/drawingml/2006/main" xmlns:p="http://schemas.openxmlformats.org/presentationml/2006/main" xmlns:r="http://schemas.openxmlformats.org/officeDocument/2006/relationships" xmlns:p14="http://schemas.microsoft.com/office/powerpoint/2010/main" xmlns:p15="http://schemas.microsoft.com/office/powerpoint/2012/main" xmlns:mc="http://schemas.openxmlformats.org/markup-compatibility/2006" type="twoObjAndObj" preserve="1">
+<p:sldLayout xmlns:a="http://schemas.openxmlformats.org/drawingml/2006/main" xmlns:r="http://schemas.openxmlformats.org/officeDocument/2006/relationships" xmlns:p="http://schemas.openxmlformats.org/presentationml/2006/main" type="twoObjAndObj" preserve="1">
   <p:cSld name="Title, 2 Content and Content">
     <p:spTree>
       <p:nvGrpSpPr>
@@ -1646,14 +1801,15 @@
           </a:ln>
         </p:spPr>
         <p:txBody>
-          <a:bodyPr lIns="0" rIns="0" tIns="0" bIns="0" anchor="ctr">
+          <a:bodyPr lIns="0" tIns="0" rIns="0" bIns="0" anchor="ctr">
             <a:noAutofit/>
           </a:bodyPr>
+          <a:lstStyle/>
           <a:p>
             <a:pPr algn="ctr">
               <a:buNone/>
             </a:pPr>
-            <a:endParaRPr b="0" lang="en-CA" sz="4400" spc="-1" strike="noStrike">
+            <a:endParaRPr lang="en-CA" sz="4400" b="0" strike="noStrike" spc="-1">
               <a:latin typeface="Arial"/>
             </a:endParaRPr>
           </a:p>
@@ -1683,11 +1839,12 @@
           </a:ln>
         </p:spPr>
         <p:txBody>
-          <a:bodyPr lIns="0" rIns="0" tIns="0" bIns="0" anchor="t">
+          <a:bodyPr lIns="0" tIns="0" rIns="0" bIns="0" anchor="t">
             <a:normAutofit/>
           </a:bodyPr>
-          <a:p>
-            <a:endParaRPr b="0" lang="en-CA" sz="3200" spc="-1" strike="noStrike">
+          <a:lstStyle/>
+          <a:p>
+            <a:endParaRPr lang="en-CA" sz="3200" b="0" strike="noStrike" spc="-1">
               <a:latin typeface="Arial"/>
             </a:endParaRPr>
           </a:p>
@@ -1717,11 +1874,12 @@
           </a:ln>
         </p:spPr>
         <p:txBody>
-          <a:bodyPr lIns="0" rIns="0" tIns="0" bIns="0" anchor="t">
+          <a:bodyPr lIns="0" tIns="0" rIns="0" bIns="0" anchor="t">
             <a:normAutofit/>
           </a:bodyPr>
-          <a:p>
-            <a:endParaRPr b="0" lang="en-CA" sz="3200" spc="-1" strike="noStrike">
+          <a:lstStyle/>
+          <a:p>
+            <a:endParaRPr lang="en-CA" sz="3200" b="0" strike="noStrike" spc="-1">
               <a:latin typeface="Arial"/>
             </a:endParaRPr>
           </a:p>
@@ -1751,11 +1909,12 @@
           </a:ln>
         </p:spPr>
         <p:txBody>
-          <a:bodyPr lIns="0" rIns="0" tIns="0" bIns="0" anchor="t">
+          <a:bodyPr lIns="0" tIns="0" rIns="0" bIns="0" anchor="t">
             <a:normAutofit/>
           </a:bodyPr>
-          <a:p>
-            <a:endParaRPr b="0" lang="en-CA" sz="3200" spc="-1" strike="noStrike">
+          <a:lstStyle/>
+          <a:p>
+            <a:endParaRPr lang="en-CA" sz="3200" b="0" strike="noStrike" spc="-1">
               <a:latin typeface="Arial"/>
             </a:endParaRPr>
           </a:p>
@@ -1774,6 +1933,7 @@
         <p:spPr/>
         <p:txBody>
           <a:bodyPr/>
+          <a:lstStyle/>
           <a:p>
             <a:r>
               <a:t>Footer</a:t>
@@ -1794,10 +1954,12 @@
         <p:spPr/>
         <p:txBody>
           <a:bodyPr/>
+          <a:lstStyle/>
           <a:p>
             <a:fld id="{603EE1A3-0233-4D6A-A7DC-79AB70281ED4}" type="slidenum">
-              <a:t>&lt;#&gt;</a:t>
+              <a:t>‹#›</a:t>
             </a:fld>
+            <a:endParaRPr/>
           </a:p>
         </p:txBody>
       </p:sp>
@@ -1814,21 +1976,22 @@
         <p:spPr/>
         <p:txBody>
           <a:bodyPr/>
-          <a:p>
-            <a:r>
-              <a:rPr lang="en-CA"/>
-              <a:t/>
-            </a:r>
+          <a:lstStyle/>
+          <a:p>
+            <a:endParaRPr/>
           </a:p>
         </p:txBody>
       </p:sp>
     </p:spTree>
   </p:cSld>
+  <p:clrMapOvr>
+    <a:masterClrMapping/>
+  </p:clrMapOvr>
 </p:sldLayout>
 </file>
 
 <file path=ppt/slideLayouts/slideLayout8.xml><?xml version="1.0" encoding="utf-8"?>
-<p:sldLayout xmlns:a="http://schemas.openxmlformats.org/drawingml/2006/main" xmlns:p="http://schemas.openxmlformats.org/presentationml/2006/main" xmlns:r="http://schemas.openxmlformats.org/officeDocument/2006/relationships" xmlns:p14="http://schemas.microsoft.com/office/powerpoint/2010/main" xmlns:p15="http://schemas.microsoft.com/office/powerpoint/2012/main" xmlns:mc="http://schemas.openxmlformats.org/markup-compatibility/2006" type="objAndTwoObj" preserve="1">
+<p:sldLayout xmlns:a="http://schemas.openxmlformats.org/drawingml/2006/main" xmlns:r="http://schemas.openxmlformats.org/officeDocument/2006/relationships" xmlns:p="http://schemas.openxmlformats.org/presentationml/2006/main" type="objAndTwoObj" preserve="1">
   <p:cSld name="Title Content and 2 Content">
     <p:spTree>
       <p:nvGrpSpPr>
@@ -1868,14 +2031,15 @@
           </a:ln>
         </p:spPr>
         <p:txBody>
-          <a:bodyPr lIns="0" rIns="0" tIns="0" bIns="0" anchor="ctr">
+          <a:bodyPr lIns="0" tIns="0" rIns="0" bIns="0" anchor="ctr">
             <a:noAutofit/>
           </a:bodyPr>
+          <a:lstStyle/>
           <a:p>
             <a:pPr algn="ctr">
               <a:buNone/>
             </a:pPr>
-            <a:endParaRPr b="0" lang="en-CA" sz="4400" spc="-1" strike="noStrike">
+            <a:endParaRPr lang="en-CA" sz="4400" b="0" strike="noStrike" spc="-1">
               <a:latin typeface="Arial"/>
             </a:endParaRPr>
           </a:p>
@@ -1905,11 +2069,12 @@
           </a:ln>
         </p:spPr>
         <p:txBody>
-          <a:bodyPr lIns="0" rIns="0" tIns="0" bIns="0" anchor="t">
+          <a:bodyPr lIns="0" tIns="0" rIns="0" bIns="0" anchor="t">
             <a:normAutofit/>
           </a:bodyPr>
-          <a:p>
-            <a:endParaRPr b="0" lang="en-CA" sz="3200" spc="-1" strike="noStrike">
+          <a:lstStyle/>
+          <a:p>
+            <a:endParaRPr lang="en-CA" sz="3200" b="0" strike="noStrike" spc="-1">
               <a:latin typeface="Arial"/>
             </a:endParaRPr>
           </a:p>
@@ -1939,11 +2104,12 @@
           </a:ln>
         </p:spPr>
         <p:txBody>
-          <a:bodyPr lIns="0" rIns="0" tIns="0" bIns="0" anchor="t">
+          <a:bodyPr lIns="0" tIns="0" rIns="0" bIns="0" anchor="t">
             <a:normAutofit/>
           </a:bodyPr>
-          <a:p>
-            <a:endParaRPr b="0" lang="en-CA" sz="3200" spc="-1" strike="noStrike">
+          <a:lstStyle/>
+          <a:p>
+            <a:endParaRPr lang="en-CA" sz="3200" b="0" strike="noStrike" spc="-1">
               <a:latin typeface="Arial"/>
             </a:endParaRPr>
           </a:p>
@@ -1973,11 +2139,12 @@
           </a:ln>
         </p:spPr>
         <p:txBody>
-          <a:bodyPr lIns="0" rIns="0" tIns="0" bIns="0" anchor="t">
+          <a:bodyPr lIns="0" tIns="0" rIns="0" bIns="0" anchor="t">
             <a:normAutofit/>
           </a:bodyPr>
-          <a:p>
-            <a:endParaRPr b="0" lang="en-CA" sz="3200" spc="-1" strike="noStrike">
+          <a:lstStyle/>
+          <a:p>
+            <a:endParaRPr lang="en-CA" sz="3200" b="0" strike="noStrike" spc="-1">
               <a:latin typeface="Arial"/>
             </a:endParaRPr>
           </a:p>
@@ -1996,6 +2163,7 @@
         <p:spPr/>
         <p:txBody>
           <a:bodyPr/>
+          <a:lstStyle/>
           <a:p>
             <a:r>
               <a:t>Footer</a:t>
@@ -2016,10 +2184,12 @@
         <p:spPr/>
         <p:txBody>
           <a:bodyPr/>
+          <a:lstStyle/>
           <a:p>
             <a:fld id="{6091A67C-0CF0-45FC-A354-83EDB5E4B929}" type="slidenum">
-              <a:t>&lt;#&gt;</a:t>
+              <a:t>‹#›</a:t>
             </a:fld>
+            <a:endParaRPr/>
           </a:p>
         </p:txBody>
       </p:sp>
@@ -2036,21 +2206,22 @@
         <p:spPr/>
         <p:txBody>
           <a:bodyPr/>
-          <a:p>
-            <a:r>
-              <a:rPr lang="en-CA"/>
-              <a:t/>
-            </a:r>
+          <a:lstStyle/>
+          <a:p>
+            <a:endParaRPr/>
           </a:p>
         </p:txBody>
       </p:sp>
     </p:spTree>
   </p:cSld>
+  <p:clrMapOvr>
+    <a:masterClrMapping/>
+  </p:clrMapOvr>
 </p:sldLayout>
 </file>
 
 <file path=ppt/slideLayouts/slideLayout9.xml><?xml version="1.0" encoding="utf-8"?>
-<p:sldLayout xmlns:a="http://schemas.openxmlformats.org/drawingml/2006/main" xmlns:p="http://schemas.openxmlformats.org/presentationml/2006/main" xmlns:r="http://schemas.openxmlformats.org/officeDocument/2006/relationships" xmlns:p14="http://schemas.microsoft.com/office/powerpoint/2010/main" xmlns:p15="http://schemas.microsoft.com/office/powerpoint/2012/main" xmlns:mc="http://schemas.openxmlformats.org/markup-compatibility/2006" type="twoObjOverTx" preserve="1">
+<p:sldLayout xmlns:a="http://schemas.openxmlformats.org/drawingml/2006/main" xmlns:r="http://schemas.openxmlformats.org/officeDocument/2006/relationships" xmlns:p="http://schemas.openxmlformats.org/presentationml/2006/main" type="twoObjOverTx" preserve="1">
   <p:cSld name="Title, 2 Content over Content">
     <p:spTree>
       <p:nvGrpSpPr>
@@ -2090,14 +2261,15 @@
           </a:ln>
         </p:spPr>
         <p:txBody>
-          <a:bodyPr lIns="0" rIns="0" tIns="0" bIns="0" anchor="ctr">
+          <a:bodyPr lIns="0" tIns="0" rIns="0" bIns="0" anchor="ctr">
             <a:noAutofit/>
           </a:bodyPr>
+          <a:lstStyle/>
           <a:p>
             <a:pPr algn="ctr">
               <a:buNone/>
             </a:pPr>
-            <a:endParaRPr b="0" lang="en-CA" sz="4400" spc="-1" strike="noStrike">
+            <a:endParaRPr lang="en-CA" sz="4400" b="0" strike="noStrike" spc="-1">
               <a:latin typeface="Arial"/>
             </a:endParaRPr>
           </a:p>
@@ -2127,11 +2299,12 @@
           </a:ln>
         </p:spPr>
         <p:txBody>
-          <a:bodyPr lIns="0" rIns="0" tIns="0" bIns="0" anchor="t">
+          <a:bodyPr lIns="0" tIns="0" rIns="0" bIns="0" anchor="t">
             <a:normAutofit/>
           </a:bodyPr>
-          <a:p>
-            <a:endParaRPr b="0" lang="en-CA" sz="3200" spc="-1" strike="noStrike">
+          <a:lstStyle/>
+          <a:p>
+            <a:endParaRPr lang="en-CA" sz="3200" b="0" strike="noStrike" spc="-1">
               <a:latin typeface="Arial"/>
             </a:endParaRPr>
           </a:p>
@@ -2161,11 +2334,12 @@
           </a:ln>
         </p:spPr>
         <p:txBody>
-          <a:bodyPr lIns="0" rIns="0" tIns="0" bIns="0" anchor="t">
+          <a:bodyPr lIns="0" tIns="0" rIns="0" bIns="0" anchor="t">
             <a:normAutofit/>
           </a:bodyPr>
-          <a:p>
-            <a:endParaRPr b="0" lang="en-CA" sz="3200" spc="-1" strike="noStrike">
+          <a:lstStyle/>
+          <a:p>
+            <a:endParaRPr lang="en-CA" sz="3200" b="0" strike="noStrike" spc="-1">
               <a:latin typeface="Arial"/>
             </a:endParaRPr>
           </a:p>
@@ -2195,11 +2369,12 @@
           </a:ln>
         </p:spPr>
         <p:txBody>
-          <a:bodyPr lIns="0" rIns="0" tIns="0" bIns="0" anchor="t">
+          <a:bodyPr lIns="0" tIns="0" rIns="0" bIns="0" anchor="t">
             <a:normAutofit/>
           </a:bodyPr>
-          <a:p>
-            <a:endParaRPr b="0" lang="en-CA" sz="3200" spc="-1" strike="noStrike">
+          <a:lstStyle/>
+          <a:p>
+            <a:endParaRPr lang="en-CA" sz="3200" b="0" strike="noStrike" spc="-1">
               <a:latin typeface="Arial"/>
             </a:endParaRPr>
           </a:p>
@@ -2218,6 +2393,7 @@
         <p:spPr/>
         <p:txBody>
           <a:bodyPr/>
+          <a:lstStyle/>
           <a:p>
             <a:r>
               <a:t>Footer</a:t>
@@ -2238,10 +2414,12 @@
         <p:spPr/>
         <p:txBody>
           <a:bodyPr/>
+          <a:lstStyle/>
           <a:p>
             <a:fld id="{0B956F98-4F1B-4153-A79B-EF5766A2A64A}" type="slidenum">
-              <a:t>&lt;#&gt;</a:t>
+              <a:t>‹#›</a:t>
             </a:fld>
+            <a:endParaRPr/>
           </a:p>
         </p:txBody>
       </p:sp>
@@ -2258,21 +2436,691 @@
         <p:spPr/>
         <p:txBody>
           <a:bodyPr/>
-          <a:p>
-            <a:r>
-              <a:rPr lang="en-CA"/>
-              <a:t/>
-            </a:r>
+          <a:lstStyle/>
+          <a:p>
+            <a:endParaRPr/>
           </a:p>
         </p:txBody>
       </p:sp>
     </p:spTree>
   </p:cSld>
+  <p:clrMapOvr>
+    <a:masterClrMapping/>
+  </p:clrMapOvr>
 </p:sldLayout>
 </file>
 
 <file path=ppt/slideMasters/slideMaster1.xml><?xml version="1.0" encoding="utf-8"?>
-<p:sldMaster xmlns:a="http://schemas.openxmlformats.org/drawingml/2006/main" xmlns:p="http://schemas.openxmlformats.org/presentationml/2006/main" xmlns:r="http://schemas.openxmlformats.org/officeDocument/2006/relationships" xmlns:p14="http://schemas.microsoft.com/office/powerpoint/2010/main" xmlns:p15="http://schemas.microsoft.com/office/powerpoint/2012/main" xmlns:mc="http://schemas.openxmlformats.org/markup-compatibility/2006">
+<p:sldMaster xmlns:a="http://schemas.openxmlformats.org/drawingml/2006/main" xmlns:r="http://schemas.openxmlformats.org/officeDocument/2006/relationships" xmlns:p="http://schemas.openxmlformats.org/presentationml/2006/main">
+  <p:cSld>
+    <p:bg>
+      <p:bgRef idx="1001">
+        <a:schemeClr val="bg1"/>
+      </p:bgRef>
+    </p:bg>
+    <p:spTree>
+      <p:nvGrpSpPr>
+        <p:cNvPr id="1" name=""/>
+        <p:cNvGrpSpPr/>
+        <p:nvPr/>
+      </p:nvGrpSpPr>
+      <p:grpSpPr>
+        <a:xfrm>
+          <a:off x="0" y="0"/>
+          <a:ext cx="0" cy="0"/>
+          <a:chOff x="0" y="0"/>
+          <a:chExt cx="0" cy="0"/>
+        </a:xfrm>
+      </p:grpSpPr>
+      <p:sp>
+        <p:nvSpPr>
+          <p:cNvPr id="5" name="PlaceHolder 1"/>
+          <p:cNvSpPr>
+            <a:spLocks noGrp="1"/>
+          </p:cNvSpPr>
+          <p:nvPr>
+            <p:ph type="title"/>
+          </p:nvPr>
+        </p:nvSpPr>
+        <p:spPr>
+          <a:xfrm>
+            <a:off x="504000" y="226080"/>
+            <a:ext cx="9071640" cy="946440"/>
+          </a:xfrm>
+          <a:prstGeom prst="rect">
+            <a:avLst/>
+          </a:prstGeom>
+          <a:noFill/>
+          <a:ln w="0">
+            <a:noFill/>
+          </a:ln>
+        </p:spPr>
+        <p:txBody>
+          <a:bodyPr lIns="0" tIns="0" rIns="0" bIns="0" anchor="ctr">
+            <a:noAutofit/>
+          </a:bodyPr>
+          <a:lstStyle/>
+          <a:p>
+            <a:pPr algn="ctr">
+              <a:buNone/>
+            </a:pPr>
+            <a:r>
+              <a:rPr lang="en-CA" sz="4400" b="0" strike="noStrike" spc="-1">
+                <a:latin typeface="Arial"/>
+              </a:rPr>
+              <a:t>Click to edit the title text format</a:t>
+            </a:r>
+          </a:p>
+        </p:txBody>
+      </p:sp>
+      <p:sp>
+        <p:nvSpPr>
+          <p:cNvPr id="6" name="PlaceHolder 2"/>
+          <p:cNvSpPr>
+            <a:spLocks noGrp="1"/>
+          </p:cNvSpPr>
+          <p:nvPr>
+            <p:ph type="body"/>
+          </p:nvPr>
+        </p:nvSpPr>
+        <p:spPr>
+          <a:xfrm>
+            <a:off x="504000" y="1326600"/>
+            <a:ext cx="9071640" cy="3288240"/>
+          </a:xfrm>
+          <a:prstGeom prst="rect">
+            <a:avLst/>
+          </a:prstGeom>
+          <a:noFill/>
+          <a:ln w="0">
+            <a:noFill/>
+          </a:ln>
+        </p:spPr>
+        <p:txBody>
+          <a:bodyPr lIns="0" tIns="0" rIns="0" bIns="0" anchor="t">
+            <a:normAutofit/>
+          </a:bodyPr>
+          <a:lstStyle/>
+          <a:p>
+            <a:pPr marL="432000" indent="-324000">
+              <a:spcBef>
+                <a:spcPts val="1417"/>
+              </a:spcBef>
+              <a:buClr>
+                <a:srgbClr val="000000"/>
+              </a:buClr>
+              <a:buSzPct val="45000"/>
+              <a:buFont typeface="Wingdings" charset="2"/>
+              <a:buChar char=""/>
+            </a:pPr>
+            <a:r>
+              <a:rPr lang="en-CA" sz="3200" b="0" strike="noStrike" spc="-1">
+                <a:latin typeface="Arial"/>
+              </a:rPr>
+              <a:t>Click to edit the outline text format</a:t>
+            </a:r>
+          </a:p>
+          <a:p>
+            <a:pPr marL="864000" lvl="1" indent="-324000">
+              <a:spcBef>
+                <a:spcPts val="1134"/>
+              </a:spcBef>
+              <a:buClr>
+                <a:srgbClr val="000000"/>
+              </a:buClr>
+              <a:buSzPct val="75000"/>
+              <a:buFont typeface="Symbol" charset="2"/>
+              <a:buChar char=""/>
+            </a:pPr>
+            <a:r>
+              <a:rPr lang="en-CA" sz="2800" b="0" strike="noStrike" spc="-1">
+                <a:latin typeface="Arial"/>
+              </a:rPr>
+              <a:t>Second Outline Level</a:t>
+            </a:r>
+          </a:p>
+          <a:p>
+            <a:pPr marL="1296000" lvl="2" indent="-288000">
+              <a:spcBef>
+                <a:spcPts val="850"/>
+              </a:spcBef>
+              <a:buClr>
+                <a:srgbClr val="000000"/>
+              </a:buClr>
+              <a:buSzPct val="45000"/>
+              <a:buFont typeface="Wingdings" charset="2"/>
+              <a:buChar char=""/>
+            </a:pPr>
+            <a:r>
+              <a:rPr lang="en-CA" sz="2400" b="0" strike="noStrike" spc="-1">
+                <a:latin typeface="Arial"/>
+              </a:rPr>
+              <a:t>Third Outline Level</a:t>
+            </a:r>
+          </a:p>
+          <a:p>
+            <a:pPr marL="1728000" lvl="3" indent="-216000">
+              <a:spcBef>
+                <a:spcPts val="567"/>
+              </a:spcBef>
+              <a:buClr>
+                <a:srgbClr val="000000"/>
+              </a:buClr>
+              <a:buSzPct val="75000"/>
+              <a:buFont typeface="Symbol" charset="2"/>
+              <a:buChar char=""/>
+            </a:pPr>
+            <a:r>
+              <a:rPr lang="en-CA" sz="2000" b="0" strike="noStrike" spc="-1">
+                <a:latin typeface="Arial"/>
+              </a:rPr>
+              <a:t>Fourth Outline Level</a:t>
+            </a:r>
+          </a:p>
+          <a:p>
+            <a:pPr marL="2160000" lvl="4" indent="-216000">
+              <a:spcBef>
+                <a:spcPts val="283"/>
+              </a:spcBef>
+              <a:buClr>
+                <a:srgbClr val="000000"/>
+              </a:buClr>
+              <a:buSzPct val="45000"/>
+              <a:buFont typeface="Wingdings" charset="2"/>
+              <a:buChar char=""/>
+            </a:pPr>
+            <a:r>
+              <a:rPr lang="en-CA" sz="2000" b="0" strike="noStrike" spc="-1">
+                <a:latin typeface="Arial"/>
+              </a:rPr>
+              <a:t>Fifth Outline Level</a:t>
+            </a:r>
+          </a:p>
+          <a:p>
+            <a:pPr marL="2592000" lvl="5" indent="-216000">
+              <a:spcBef>
+                <a:spcPts val="283"/>
+              </a:spcBef>
+              <a:buClr>
+                <a:srgbClr val="000000"/>
+              </a:buClr>
+              <a:buSzPct val="45000"/>
+              <a:buFont typeface="Wingdings" charset="2"/>
+              <a:buChar char=""/>
+            </a:pPr>
+            <a:r>
+              <a:rPr lang="en-CA" sz="2000" b="0" strike="noStrike" spc="-1">
+                <a:latin typeface="Arial"/>
+              </a:rPr>
+              <a:t>Sixth Outline Level</a:t>
+            </a:r>
+          </a:p>
+          <a:p>
+            <a:pPr marL="3024000" lvl="6" indent="-216000">
+              <a:spcBef>
+                <a:spcPts val="283"/>
+              </a:spcBef>
+              <a:buClr>
+                <a:srgbClr val="000000"/>
+              </a:buClr>
+              <a:buSzPct val="45000"/>
+              <a:buFont typeface="Wingdings" charset="2"/>
+              <a:buChar char=""/>
+            </a:pPr>
+            <a:r>
+              <a:rPr lang="en-CA" sz="2000" b="0" strike="noStrike" spc="-1">
+                <a:latin typeface="Arial"/>
+              </a:rPr>
+              <a:t>Seventh Outline Level</a:t>
+            </a:r>
+          </a:p>
+        </p:txBody>
+      </p:sp>
+      <p:sp>
+        <p:nvSpPr>
+          <p:cNvPr id="2" name="PlaceHolder 3"/>
+          <p:cNvSpPr>
+            <a:spLocks noGrp="1"/>
+          </p:cNvSpPr>
+          <p:nvPr>
+            <p:ph type="dt" idx="1"/>
+          </p:nvPr>
+        </p:nvSpPr>
+        <p:spPr>
+          <a:xfrm>
+            <a:off x="504000" y="5165280"/>
+            <a:ext cx="2348280" cy="390600"/>
+          </a:xfrm>
+          <a:prstGeom prst="rect">
+            <a:avLst/>
+          </a:prstGeom>
+          <a:noFill/>
+          <a:ln w="0">
+            <a:noFill/>
+          </a:ln>
+        </p:spPr>
+        <p:txBody>
+          <a:bodyPr lIns="0" tIns="0" rIns="0" bIns="0" anchor="t">
+            <a:noAutofit/>
+          </a:bodyPr>
+          <a:lstStyle>
+            <a:lvl1pPr>
+              <a:defRPr lang="en-CA" sz="1400" b="0" strike="noStrike" spc="-1">
+                <a:latin typeface="Times New Roman"/>
+              </a:defRPr>
+            </a:lvl1pPr>
+          </a:lstStyle>
+          <a:p>
+            <a:r>
+              <a:rPr lang="en-CA" sz="1400" b="0" strike="noStrike" spc="-1">
+                <a:latin typeface="Times New Roman"/>
+              </a:rPr>
+              <a:t>&lt;date/time&gt;</a:t>
+            </a:r>
+          </a:p>
+        </p:txBody>
+      </p:sp>
+      <p:sp>
+        <p:nvSpPr>
+          <p:cNvPr id="3" name="PlaceHolder 4"/>
+          <p:cNvSpPr>
+            <a:spLocks noGrp="1"/>
+          </p:cNvSpPr>
+          <p:nvPr>
+            <p:ph type="ftr" idx="2"/>
+          </p:nvPr>
+        </p:nvSpPr>
+        <p:spPr>
+          <a:xfrm>
+            <a:off x="3447360" y="5165280"/>
+            <a:ext cx="3195000" cy="390600"/>
+          </a:xfrm>
+          <a:prstGeom prst="rect">
+            <a:avLst/>
+          </a:prstGeom>
+          <a:noFill/>
+          <a:ln w="0">
+            <a:noFill/>
+          </a:ln>
+        </p:spPr>
+        <p:txBody>
+          <a:bodyPr lIns="0" tIns="0" rIns="0" bIns="0" anchor="t">
+            <a:noAutofit/>
+          </a:bodyPr>
+          <a:lstStyle>
+            <a:lvl1pPr algn="ctr">
+              <a:buNone/>
+              <a:defRPr lang="en-CA" sz="1400" b="0" strike="noStrike" spc="-1">
+                <a:latin typeface="Times New Roman"/>
+              </a:defRPr>
+            </a:lvl1pPr>
+          </a:lstStyle>
+          <a:p>
+            <a:pPr algn="ctr">
+              <a:buNone/>
+            </a:pPr>
+            <a:r>
+              <a:rPr lang="en-CA" sz="1400" b="0" strike="noStrike" spc="-1">
+                <a:latin typeface="Times New Roman"/>
+              </a:rPr>
+              <a:t>&lt;footer&gt;</a:t>
+            </a:r>
+          </a:p>
+        </p:txBody>
+      </p:sp>
+      <p:sp>
+        <p:nvSpPr>
+          <p:cNvPr id="4" name="PlaceHolder 5"/>
+          <p:cNvSpPr>
+            <a:spLocks noGrp="1"/>
+          </p:cNvSpPr>
+          <p:nvPr>
+            <p:ph type="sldNum" idx="3"/>
+          </p:nvPr>
+        </p:nvSpPr>
+        <p:spPr>
+          <a:xfrm>
+            <a:off x="7227360" y="5165280"/>
+            <a:ext cx="2348280" cy="390600"/>
+          </a:xfrm>
+          <a:prstGeom prst="rect">
+            <a:avLst/>
+          </a:prstGeom>
+          <a:noFill/>
+          <a:ln w="0">
+            <a:noFill/>
+          </a:ln>
+        </p:spPr>
+        <p:txBody>
+          <a:bodyPr lIns="0" tIns="0" rIns="0" bIns="0" anchor="t">
+            <a:noAutofit/>
+          </a:bodyPr>
+          <a:lstStyle>
+            <a:lvl1pPr algn="r">
+              <a:buNone/>
+              <a:defRPr lang="en-CA" sz="1400" b="0" strike="noStrike" spc="-1">
+                <a:latin typeface="Times New Roman"/>
+              </a:defRPr>
+            </a:lvl1pPr>
+          </a:lstStyle>
+          <a:p>
+            <a:pPr algn="r">
+              <a:buNone/>
+            </a:pPr>
+            <a:fld id="{01B5FC46-AF9F-4DDE-B773-7FA313C58967}" type="slidenum">
+              <a:rPr lang="en-CA" sz="1400" b="0" strike="noStrike" spc="-1">
+                <a:latin typeface="Times New Roman"/>
+              </a:rPr>
+              <a:t>‹#›</a:t>
+            </a:fld>
+            <a:endParaRPr lang="en-CA" sz="1400" b="0" strike="noStrike" spc="-1">
+              <a:latin typeface="Times New Roman"/>
+            </a:endParaRPr>
+          </a:p>
+        </p:txBody>
+      </p:sp>
+    </p:spTree>
+  </p:cSld>
+  <p:clrMap bg1="lt1" tx1="dk1" bg2="lt2" tx2="dk2" accent1="accent1" accent2="accent2" accent3="accent3" accent4="accent4" accent5="accent5" accent6="accent6" hlink="hlink" folHlink="folHlink"/>
+  <p:sldLayoutIdLst>
+    <p:sldLayoutId id="2147483649" r:id="rId1"/>
+    <p:sldLayoutId id="2147483650" r:id="rId2"/>
+    <p:sldLayoutId id="2147483651" r:id="rId3"/>
+    <p:sldLayoutId id="2147483652" r:id="rId4"/>
+    <p:sldLayoutId id="2147483653" r:id="rId5"/>
+    <p:sldLayoutId id="2147483654" r:id="rId6"/>
+    <p:sldLayoutId id="2147483655" r:id="rId7"/>
+    <p:sldLayoutId id="2147483656" r:id="rId8"/>
+    <p:sldLayoutId id="2147483657" r:id="rId9"/>
+    <p:sldLayoutId id="2147483658" r:id="rId10"/>
+    <p:sldLayoutId id="2147483659" r:id="rId11"/>
+    <p:sldLayoutId id="2147483660" r:id="rId12"/>
+  </p:sldLayoutIdLst>
+  <p:txStyles>
+    <p:titleStyle>
+      <a:lvl1pPr algn="l" defTabSz="914400" rtl="0" eaLnBrk="1" latinLnBrk="0" hangingPunct="1">
+        <a:lnSpc>
+          <a:spcPct val="90000"/>
+        </a:lnSpc>
+        <a:spcBef>
+          <a:spcPct val="0"/>
+        </a:spcBef>
+        <a:buNone/>
+        <a:defRPr sz="4400" kern="1200">
+          <a:solidFill>
+            <a:schemeClr val="tx1"/>
+          </a:solidFill>
+          <a:latin typeface="+mj-lt"/>
+          <a:ea typeface="+mj-ea"/>
+          <a:cs typeface="+mj-cs"/>
+        </a:defRPr>
+      </a:lvl1pPr>
+    </p:titleStyle>
+    <p:bodyStyle>
+      <a:lvl1pPr marL="228600" indent="-228600" algn="l" defTabSz="914400" rtl="0" eaLnBrk="1" latinLnBrk="0" hangingPunct="1">
+        <a:lnSpc>
+          <a:spcPct val="90000"/>
+        </a:lnSpc>
+        <a:spcBef>
+          <a:spcPts val="1000"/>
+        </a:spcBef>
+        <a:buFont typeface="Arial" panose="020B0604020202020204" pitchFamily="34" charset="0"/>
+        <a:buChar char="•"/>
+        <a:defRPr sz="2800" kern="1200">
+          <a:solidFill>
+            <a:schemeClr val="tx1"/>
+          </a:solidFill>
+          <a:latin typeface="+mn-lt"/>
+          <a:ea typeface="+mn-ea"/>
+          <a:cs typeface="+mn-cs"/>
+        </a:defRPr>
+      </a:lvl1pPr>
+      <a:lvl2pPr marL="685800" indent="-228600" algn="l" defTabSz="914400" rtl="0" eaLnBrk="1" latinLnBrk="0" hangingPunct="1">
+        <a:lnSpc>
+          <a:spcPct val="90000"/>
+        </a:lnSpc>
+        <a:spcBef>
+          <a:spcPts val="500"/>
+        </a:spcBef>
+        <a:buFont typeface="Arial" panose="020B0604020202020204" pitchFamily="34" charset="0"/>
+        <a:buChar char="•"/>
+        <a:defRPr sz="2400" kern="1200">
+          <a:solidFill>
+            <a:schemeClr val="tx1"/>
+          </a:solidFill>
+          <a:latin typeface="+mn-lt"/>
+          <a:ea typeface="+mn-ea"/>
+          <a:cs typeface="+mn-cs"/>
+        </a:defRPr>
+      </a:lvl2pPr>
+      <a:lvl3pPr marL="1143000" indent="-228600" algn="l" defTabSz="914400" rtl="0" eaLnBrk="1" latinLnBrk="0" hangingPunct="1">
+        <a:lnSpc>
+          <a:spcPct val="90000"/>
+        </a:lnSpc>
+        <a:spcBef>
+          <a:spcPts val="500"/>
+        </a:spcBef>
+        <a:buFont typeface="Arial" panose="020B0604020202020204" pitchFamily="34" charset="0"/>
+        <a:buChar char="•"/>
+        <a:defRPr sz="2000" kern="1200">
+          <a:solidFill>
+            <a:schemeClr val="tx1"/>
+          </a:solidFill>
+          <a:latin typeface="+mn-lt"/>
+          <a:ea typeface="+mn-ea"/>
+          <a:cs typeface="+mn-cs"/>
+        </a:defRPr>
+      </a:lvl3pPr>
+      <a:lvl4pPr marL="1600200" indent="-228600" algn="l" defTabSz="914400" rtl="0" eaLnBrk="1" latinLnBrk="0" hangingPunct="1">
+        <a:lnSpc>
+          <a:spcPct val="90000"/>
+        </a:lnSpc>
+        <a:spcBef>
+          <a:spcPts val="500"/>
+        </a:spcBef>
+        <a:buFont typeface="Arial" panose="020B0604020202020204" pitchFamily="34" charset="0"/>
+        <a:buChar char="•"/>
+        <a:defRPr sz="1800" kern="1200">
+          <a:solidFill>
+            <a:schemeClr val="tx1"/>
+          </a:solidFill>
+          <a:latin typeface="+mn-lt"/>
+          <a:ea typeface="+mn-ea"/>
+          <a:cs typeface="+mn-cs"/>
+        </a:defRPr>
+      </a:lvl4pPr>
+      <a:lvl5pPr marL="2057400" indent="-228600" algn="l" defTabSz="914400" rtl="0" eaLnBrk="1" latinLnBrk="0" hangingPunct="1">
+        <a:lnSpc>
+          <a:spcPct val="90000"/>
+        </a:lnSpc>
+        <a:spcBef>
+          <a:spcPts val="500"/>
+        </a:spcBef>
+        <a:buFont typeface="Arial" panose="020B0604020202020204" pitchFamily="34" charset="0"/>
+        <a:buChar char="•"/>
+        <a:defRPr sz="1800" kern="1200">
+          <a:solidFill>
+            <a:schemeClr val="tx1"/>
+          </a:solidFill>
+          <a:latin typeface="+mn-lt"/>
+          <a:ea typeface="+mn-ea"/>
+          <a:cs typeface="+mn-cs"/>
+        </a:defRPr>
+      </a:lvl5pPr>
+      <a:lvl6pPr marL="2514600" indent="-228600" algn="l" defTabSz="914400" rtl="0" eaLnBrk="1" latinLnBrk="0" hangingPunct="1">
+        <a:lnSpc>
+          <a:spcPct val="90000"/>
+        </a:lnSpc>
+        <a:spcBef>
+          <a:spcPts val="500"/>
+        </a:spcBef>
+        <a:buFont typeface="Arial" panose="020B0604020202020204" pitchFamily="34" charset="0"/>
+        <a:buChar char="•"/>
+        <a:defRPr sz="1800" kern="1200">
+          <a:solidFill>
+            <a:schemeClr val="tx1"/>
+          </a:solidFill>
+          <a:latin typeface="+mn-lt"/>
+          <a:ea typeface="+mn-ea"/>
+          <a:cs typeface="+mn-cs"/>
+        </a:defRPr>
+      </a:lvl6pPr>
+      <a:lvl7pPr marL="2971800" indent="-228600" algn="l" defTabSz="914400" rtl="0" eaLnBrk="1" latinLnBrk="0" hangingPunct="1">
+        <a:lnSpc>
+          <a:spcPct val="90000"/>
+        </a:lnSpc>
+        <a:spcBef>
+          <a:spcPts val="500"/>
+        </a:spcBef>
+        <a:buFont typeface="Arial" panose="020B0604020202020204" pitchFamily="34" charset="0"/>
+        <a:buChar char="•"/>
+        <a:defRPr sz="1800" kern="1200">
+          <a:solidFill>
+            <a:schemeClr val="tx1"/>
+          </a:solidFill>
+          <a:latin typeface="+mn-lt"/>
+          <a:ea typeface="+mn-ea"/>
+          <a:cs typeface="+mn-cs"/>
+        </a:defRPr>
+      </a:lvl7pPr>
+      <a:lvl8pPr marL="3429000" indent="-228600" algn="l" defTabSz="914400" rtl="0" eaLnBrk="1" latinLnBrk="0" hangingPunct="1">
+        <a:lnSpc>
+          <a:spcPct val="90000"/>
+        </a:lnSpc>
+        <a:spcBef>
+          <a:spcPts val="500"/>
+        </a:spcBef>
+        <a:buFont typeface="Arial" panose="020B0604020202020204" pitchFamily="34" charset="0"/>
+        <a:buChar char="•"/>
+        <a:defRPr sz="1800" kern="1200">
+          <a:solidFill>
+            <a:schemeClr val="tx1"/>
+          </a:solidFill>
+          <a:latin typeface="+mn-lt"/>
+          <a:ea typeface="+mn-ea"/>
+          <a:cs typeface="+mn-cs"/>
+        </a:defRPr>
+      </a:lvl8pPr>
+      <a:lvl9pPr marL="3886200" indent="-228600" algn="l" defTabSz="914400" rtl="0" eaLnBrk="1" latinLnBrk="0" hangingPunct="1">
+        <a:lnSpc>
+          <a:spcPct val="90000"/>
+        </a:lnSpc>
+        <a:spcBef>
+          <a:spcPts val="500"/>
+        </a:spcBef>
+        <a:buFont typeface="Arial" panose="020B0604020202020204" pitchFamily="34" charset="0"/>
+        <a:buChar char="•"/>
+        <a:defRPr sz="1800" kern="1200">
+          <a:solidFill>
+            <a:schemeClr val="tx1"/>
+          </a:solidFill>
+          <a:latin typeface="+mn-lt"/>
+          <a:ea typeface="+mn-ea"/>
+          <a:cs typeface="+mn-cs"/>
+        </a:defRPr>
+      </a:lvl9pPr>
+    </p:bodyStyle>
+    <p:otherStyle>
+      <a:defPPr>
+        <a:defRPr lang="en-US"/>
+      </a:defPPr>
+      <a:lvl1pPr marL="0" algn="l" defTabSz="914400" rtl="0" eaLnBrk="1" latinLnBrk="0" hangingPunct="1">
+        <a:defRPr sz="1800" kern="1200">
+          <a:solidFill>
+            <a:schemeClr val="tx1"/>
+          </a:solidFill>
+          <a:latin typeface="+mn-lt"/>
+          <a:ea typeface="+mn-ea"/>
+          <a:cs typeface="+mn-cs"/>
+        </a:defRPr>
+      </a:lvl1pPr>
+      <a:lvl2pPr marL="457200" algn="l" defTabSz="914400" rtl="0" eaLnBrk="1" latinLnBrk="0" hangingPunct="1">
+        <a:defRPr sz="1800" kern="1200">
+          <a:solidFill>
+            <a:schemeClr val="tx1"/>
+          </a:solidFill>
+          <a:latin typeface="+mn-lt"/>
+          <a:ea typeface="+mn-ea"/>
+          <a:cs typeface="+mn-cs"/>
+        </a:defRPr>
+      </a:lvl2pPr>
+      <a:lvl3pPr marL="914400" algn="l" defTabSz="914400" rtl="0" eaLnBrk="1" latinLnBrk="0" hangingPunct="1">
+        <a:defRPr sz="1800" kern="1200">
+          <a:solidFill>
+            <a:schemeClr val="tx1"/>
+          </a:solidFill>
+          <a:latin typeface="+mn-lt"/>
+          <a:ea typeface="+mn-ea"/>
+          <a:cs typeface="+mn-cs"/>
+        </a:defRPr>
+      </a:lvl3pPr>
+      <a:lvl4pPr marL="1371600" algn="l" defTabSz="914400" rtl="0" eaLnBrk="1" latinLnBrk="0" hangingPunct="1">
+        <a:defRPr sz="1800" kern="1200">
+          <a:solidFill>
+            <a:schemeClr val="tx1"/>
+          </a:solidFill>
+          <a:latin typeface="+mn-lt"/>
+          <a:ea typeface="+mn-ea"/>
+          <a:cs typeface="+mn-cs"/>
+        </a:defRPr>
+      </a:lvl4pPr>
+      <a:lvl5pPr marL="1828800" algn="l" defTabSz="914400" rtl="0" eaLnBrk="1" latinLnBrk="0" hangingPunct="1">
+        <a:defRPr sz="1800" kern="1200">
+          <a:solidFill>
+            <a:schemeClr val="tx1"/>
+          </a:solidFill>
+          <a:latin typeface="+mn-lt"/>
+          <a:ea typeface="+mn-ea"/>
+          <a:cs typeface="+mn-cs"/>
+        </a:defRPr>
+      </a:lvl5pPr>
+      <a:lvl6pPr marL="2286000" algn="l" defTabSz="914400" rtl="0" eaLnBrk="1" latinLnBrk="0" hangingPunct="1">
+        <a:defRPr sz="1800" kern="1200">
+          <a:solidFill>
+            <a:schemeClr val="tx1"/>
+          </a:solidFill>
+          <a:latin typeface="+mn-lt"/>
+          <a:ea typeface="+mn-ea"/>
+          <a:cs typeface="+mn-cs"/>
+        </a:defRPr>
+      </a:lvl6pPr>
+      <a:lvl7pPr marL="2743200" algn="l" defTabSz="914400" rtl="0" eaLnBrk="1" latinLnBrk="0" hangingPunct="1">
+        <a:defRPr sz="1800" kern="1200">
+          <a:solidFill>
+            <a:schemeClr val="tx1"/>
+          </a:solidFill>
+          <a:latin typeface="+mn-lt"/>
+          <a:ea typeface="+mn-ea"/>
+          <a:cs typeface="+mn-cs"/>
+        </a:defRPr>
+      </a:lvl7pPr>
+      <a:lvl8pPr marL="3200400" algn="l" defTabSz="914400" rtl="0" eaLnBrk="1" latinLnBrk="0" hangingPunct="1">
+        <a:defRPr sz="1800" kern="1200">
+          <a:solidFill>
+            <a:schemeClr val="tx1"/>
+          </a:solidFill>
+          <a:latin typeface="+mn-lt"/>
+          <a:ea typeface="+mn-ea"/>
+          <a:cs typeface="+mn-cs"/>
+        </a:defRPr>
+      </a:lvl8pPr>
+      <a:lvl9pPr marL="3657600" algn="l" defTabSz="914400" rtl="0" eaLnBrk="1" latinLnBrk="0" hangingPunct="1">
+        <a:defRPr sz="1800" kern="1200">
+          <a:solidFill>
+            <a:schemeClr val="tx1"/>
+          </a:solidFill>
+          <a:latin typeface="+mn-lt"/>
+          <a:ea typeface="+mn-ea"/>
+          <a:cs typeface="+mn-cs"/>
+        </a:defRPr>
+      </a:lvl9pPr>
+    </p:otherStyle>
+  </p:txStyles>
+</p:sldMaster>
+</file>
+
+<file path=ppt/slides/slide1.xml><?xml version="1.0" encoding="utf-8"?>
+<p:sld xmlns:a="http://schemas.openxmlformats.org/drawingml/2006/main" xmlns:r="http://schemas.openxmlformats.org/officeDocument/2006/relationships" xmlns:p="http://schemas.openxmlformats.org/presentationml/2006/main">
   <p:cSld>
     <p:spTree>
       <p:nvGrpSpPr>
@@ -2290,7 +3138,7 @@
       </p:grpSpPr>
       <p:sp>
         <p:nvSpPr>
-          <p:cNvPr id="0" name="PlaceHolder 1"/>
+          <p:cNvPr id="41" name="PlaceHolder 1"/>
           <p:cNvSpPr>
             <a:spLocks noGrp="1"/>
           </p:cNvSpPr>
@@ -2312,33 +3160,31 @@
           </a:ln>
         </p:spPr>
         <p:txBody>
-          <a:bodyPr lIns="0" rIns="0" tIns="0" bIns="0" anchor="ctr">
+          <a:bodyPr lIns="0" tIns="0" rIns="0" bIns="0" anchor="ctr">
             <a:noAutofit/>
           </a:bodyPr>
+          <a:lstStyle/>
           <a:p>
             <a:pPr algn="ctr">
               <a:buNone/>
             </a:pPr>
             <a:r>
-              <a:rPr b="0" lang="en-CA" sz="4400" spc="-1" strike="noStrike">
+              <a:rPr lang="en-CA" sz="4400" b="0" strike="noStrike" spc="-1" dirty="0">
                 <a:latin typeface="Arial"/>
               </a:rPr>
-              <a:t>Click to edit the title text format</a:t>
-            </a:r>
-            <a:endParaRPr b="0" lang="en-CA" sz="4400" spc="-1" strike="noStrike">
-              <a:latin typeface="Arial"/>
-            </a:endParaRPr>
-          </a:p>
-        </p:txBody>
-      </p:sp>
-      <p:sp>
-        <p:nvSpPr>
-          <p:cNvPr id="1" name="PlaceHolder 2"/>
-          <p:cNvSpPr>
-            <a:spLocks noGrp="1"/>
-          </p:cNvSpPr>
-          <p:nvPr>
-            <p:ph type="body"/>
+              <a:t>Automatic Loan Fast Approval</a:t>
+            </a:r>
+          </a:p>
+        </p:txBody>
+      </p:sp>
+      <p:sp>
+        <p:nvSpPr>
+          <p:cNvPr id="42" name="PlaceHolder 2"/>
+          <p:cNvSpPr>
+            <a:spLocks noGrp="1"/>
+          </p:cNvSpPr>
+          <p:nvPr>
+            <p:ph type="subTitle"/>
           </p:nvPr>
         </p:nvSpPr>
         <p:spPr>
@@ -2355,336 +3201,44 @@
           </a:ln>
         </p:spPr>
         <p:txBody>
-          <a:bodyPr lIns="0" rIns="0" tIns="0" bIns="0" anchor="t">
-            <a:normAutofit/>
-          </a:bodyPr>
-          <a:p>
-            <a:pPr marL="432000" indent="-324000">
-              <a:spcBef>
-                <a:spcPts val="1417"/>
-              </a:spcBef>
-              <a:buClr>
-                <a:srgbClr val="000000"/>
-              </a:buClr>
-              <a:buSzPct val="45000"/>
-              <a:buFont typeface="Wingdings" charset="2"/>
-              <a:buChar char=""/>
-            </a:pPr>
-            <a:r>
-              <a:rPr b="0" lang="en-CA" sz="3200" spc="-1" strike="noStrike">
+          <a:bodyPr lIns="0" tIns="0" rIns="0" bIns="0" anchor="ctr">
+            <a:noAutofit/>
+          </a:bodyPr>
+          <a:lstStyle/>
+          <a:p>
+            <a:pPr algn="ctr">
+              <a:buNone/>
+            </a:pPr>
+            <a:r>
+              <a:rPr lang="en-CA" sz="3200" b="0" strike="noStrike" spc="-1" dirty="0">
                 <a:latin typeface="Arial"/>
               </a:rPr>
-              <a:t>Click to edit the outline text format</a:t>
-            </a:r>
-            <a:endParaRPr b="0" lang="en-CA" sz="3200" spc="-1" strike="noStrike">
-              <a:latin typeface="Arial"/>
-            </a:endParaRPr>
-          </a:p>
-          <a:p>
-            <a:pPr lvl="1" marL="864000" indent="-324000">
-              <a:spcBef>
-                <a:spcPts val="1134"/>
-              </a:spcBef>
-              <a:buClr>
-                <a:srgbClr val="000000"/>
-              </a:buClr>
-              <a:buSzPct val="75000"/>
-              <a:buFont typeface="Symbol" charset="2"/>
-              <a:buChar char=""/>
-            </a:pPr>
-            <a:r>
-              <a:rPr b="0" lang="en-CA" sz="2800" spc="-1" strike="noStrike">
+              <a:t>Is it possible?</a:t>
+            </a:r>
+          </a:p>
+          <a:p>
+            <a:pPr algn="ctr">
+              <a:buNone/>
+            </a:pPr>
+            <a:r>
+              <a:rPr lang="en-CA" sz="3200" b="0" strike="noStrike" spc="-1" dirty="0">
                 <a:latin typeface="Arial"/>
               </a:rPr>
-              <a:t>Second Outline Level</a:t>
-            </a:r>
-            <a:endParaRPr b="0" lang="en-CA" sz="2800" spc="-1" strike="noStrike">
-              <a:latin typeface="Arial"/>
-            </a:endParaRPr>
-          </a:p>
-          <a:p>
-            <a:pPr lvl="2" marL="1296000" indent="-288000">
-              <a:spcBef>
-                <a:spcPts val="850"/>
-              </a:spcBef>
-              <a:buClr>
-                <a:srgbClr val="000000"/>
-              </a:buClr>
-              <a:buSzPct val="45000"/>
-              <a:buFont typeface="Wingdings" charset="2"/>
-              <a:buChar char=""/>
-            </a:pPr>
-            <a:r>
-              <a:rPr b="0" lang="en-CA" sz="2400" spc="-1" strike="noStrike">
-                <a:latin typeface="Arial"/>
-              </a:rPr>
-              <a:t>Third Outline Level</a:t>
-            </a:r>
-            <a:endParaRPr b="0" lang="en-CA" sz="2400" spc="-1" strike="noStrike">
-              <a:latin typeface="Arial"/>
-            </a:endParaRPr>
-          </a:p>
-          <a:p>
-            <a:pPr lvl="3" marL="1728000" indent="-216000">
-              <a:spcBef>
-                <a:spcPts val="567"/>
-              </a:spcBef>
-              <a:buClr>
-                <a:srgbClr val="000000"/>
-              </a:buClr>
-              <a:buSzPct val="75000"/>
-              <a:buFont typeface="Symbol" charset="2"/>
-              <a:buChar char=""/>
-            </a:pPr>
-            <a:r>
-              <a:rPr b="0" lang="en-CA" sz="2000" spc="-1" strike="noStrike">
-                <a:latin typeface="Arial"/>
-              </a:rPr>
-              <a:t>Fourth Outline Level</a:t>
-            </a:r>
-            <a:endParaRPr b="0" lang="en-CA" sz="2000" spc="-1" strike="noStrike">
-              <a:latin typeface="Arial"/>
-            </a:endParaRPr>
-          </a:p>
-          <a:p>
-            <a:pPr lvl="4" marL="2160000" indent="-216000">
-              <a:spcBef>
-                <a:spcPts val="283"/>
-              </a:spcBef>
-              <a:buClr>
-                <a:srgbClr val="000000"/>
-              </a:buClr>
-              <a:buSzPct val="45000"/>
-              <a:buFont typeface="Wingdings" charset="2"/>
-              <a:buChar char=""/>
-            </a:pPr>
-            <a:r>
-              <a:rPr b="0" lang="en-CA" sz="2000" spc="-1" strike="noStrike">
-                <a:latin typeface="Arial"/>
-              </a:rPr>
-              <a:t>Fifth Outline Level</a:t>
-            </a:r>
-            <a:endParaRPr b="0" lang="en-CA" sz="2000" spc="-1" strike="noStrike">
-              <a:latin typeface="Arial"/>
-            </a:endParaRPr>
-          </a:p>
-          <a:p>
-            <a:pPr lvl="5" marL="2592000" indent="-216000">
-              <a:spcBef>
-                <a:spcPts val="283"/>
-              </a:spcBef>
-              <a:buClr>
-                <a:srgbClr val="000000"/>
-              </a:buClr>
-              <a:buSzPct val="45000"/>
-              <a:buFont typeface="Wingdings" charset="2"/>
-              <a:buChar char=""/>
-            </a:pPr>
-            <a:r>
-              <a:rPr b="0" lang="en-CA" sz="2000" spc="-1" strike="noStrike">
-                <a:latin typeface="Arial"/>
-              </a:rPr>
-              <a:t>Sixth Outline Level</a:t>
-            </a:r>
-            <a:endParaRPr b="0" lang="en-CA" sz="2000" spc="-1" strike="noStrike">
-              <a:latin typeface="Arial"/>
-            </a:endParaRPr>
-          </a:p>
-          <a:p>
-            <a:pPr lvl="6" marL="3024000" indent="-216000">
-              <a:spcBef>
-                <a:spcPts val="283"/>
-              </a:spcBef>
-              <a:buClr>
-                <a:srgbClr val="000000"/>
-              </a:buClr>
-              <a:buSzPct val="45000"/>
-              <a:buFont typeface="Wingdings" charset="2"/>
-              <a:buChar char=""/>
-            </a:pPr>
-            <a:r>
-              <a:rPr b="0" lang="en-CA" sz="2000" spc="-1" strike="noStrike">
-                <a:latin typeface="Arial"/>
-              </a:rPr>
-              <a:t>Seventh Outline Level</a:t>
-            </a:r>
-            <a:endParaRPr b="0" lang="en-CA" sz="2000" spc="-1" strike="noStrike">
-              <a:latin typeface="Arial"/>
-            </a:endParaRPr>
-          </a:p>
-        </p:txBody>
-      </p:sp>
-      <p:sp>
-        <p:nvSpPr>
-          <p:cNvPr id="2" name="PlaceHolder 3"/>
-          <p:cNvSpPr>
-            <a:spLocks noGrp="1"/>
-          </p:cNvSpPr>
-          <p:nvPr>
-            <p:ph type="dt" idx="1"/>
-          </p:nvPr>
-        </p:nvSpPr>
-        <p:spPr>
-          <a:xfrm>
-            <a:off x="504000" y="5165280"/>
-            <a:ext cx="2348280" cy="390600"/>
-          </a:xfrm>
-          <a:prstGeom prst="rect">
-            <a:avLst/>
-          </a:prstGeom>
-          <a:noFill/>
-          <a:ln w="0">
-            <a:noFill/>
-          </a:ln>
-        </p:spPr>
-        <p:txBody>
-          <a:bodyPr lIns="0" rIns="0" tIns="0" bIns="0" anchor="t">
-            <a:noAutofit/>
-          </a:bodyPr>
-          <a:lstStyle>
-            <a:lvl1pPr>
-              <a:defRPr b="0" lang="en-CA" sz="1400" spc="-1" strike="noStrike">
-                <a:latin typeface="Times New Roman"/>
-              </a:defRPr>
-            </a:lvl1pPr>
-          </a:lstStyle>
-          <a:p>
-            <a:r>
-              <a:rPr b="0" lang="en-CA" sz="1400" spc="-1" strike="noStrike">
-                <a:latin typeface="Times New Roman"/>
-              </a:rPr>
-              <a:t>&lt;date/time&gt;</a:t>
-            </a:r>
-            <a:endParaRPr b="0" lang="en-CA" sz="1400" spc="-1" strike="noStrike">
-              <a:latin typeface="Times New Roman"/>
-            </a:endParaRPr>
-          </a:p>
-        </p:txBody>
-      </p:sp>
-      <p:sp>
-        <p:nvSpPr>
-          <p:cNvPr id="3" name="PlaceHolder 4"/>
-          <p:cNvSpPr>
-            <a:spLocks noGrp="1"/>
-          </p:cNvSpPr>
-          <p:nvPr>
-            <p:ph type="ftr" idx="2"/>
-          </p:nvPr>
-        </p:nvSpPr>
-        <p:spPr>
-          <a:xfrm>
-            <a:off x="3447360" y="5165280"/>
-            <a:ext cx="3195000" cy="390600"/>
-          </a:xfrm>
-          <a:prstGeom prst="rect">
-            <a:avLst/>
-          </a:prstGeom>
-          <a:noFill/>
-          <a:ln w="0">
-            <a:noFill/>
-          </a:ln>
-        </p:spPr>
-        <p:txBody>
-          <a:bodyPr lIns="0" rIns="0" tIns="0" bIns="0" anchor="t">
-            <a:noAutofit/>
-          </a:bodyPr>
-          <a:lstStyle>
-            <a:lvl1pPr algn="ctr">
-              <a:buNone/>
-              <a:defRPr b="0" lang="en-CA" sz="1400" spc="-1" strike="noStrike">
-                <a:latin typeface="Times New Roman"/>
-              </a:defRPr>
-            </a:lvl1pPr>
-          </a:lstStyle>
-          <a:p>
-            <a:pPr algn="ctr">
-              <a:buNone/>
-            </a:pPr>
-            <a:r>
-              <a:rPr b="0" lang="en-CA" sz="1400" spc="-1" strike="noStrike">
-                <a:latin typeface="Times New Roman"/>
-              </a:rPr>
-              <a:t>&lt;footer&gt;</a:t>
-            </a:r>
-            <a:endParaRPr b="0" lang="en-CA" sz="1400" spc="-1" strike="noStrike">
-              <a:latin typeface="Times New Roman"/>
-            </a:endParaRPr>
-          </a:p>
-        </p:txBody>
-      </p:sp>
-      <p:sp>
-        <p:nvSpPr>
-          <p:cNvPr id="4" name="PlaceHolder 5"/>
-          <p:cNvSpPr>
-            <a:spLocks noGrp="1"/>
-          </p:cNvSpPr>
-          <p:nvPr>
-            <p:ph type="sldNum" idx="3"/>
-          </p:nvPr>
-        </p:nvSpPr>
-        <p:spPr>
-          <a:xfrm>
-            <a:off x="7227360" y="5165280"/>
-            <a:ext cx="2348280" cy="390600"/>
-          </a:xfrm>
-          <a:prstGeom prst="rect">
-            <a:avLst/>
-          </a:prstGeom>
-          <a:noFill/>
-          <a:ln w="0">
-            <a:noFill/>
-          </a:ln>
-        </p:spPr>
-        <p:txBody>
-          <a:bodyPr lIns="0" rIns="0" tIns="0" bIns="0" anchor="t">
-            <a:noAutofit/>
-          </a:bodyPr>
-          <a:lstStyle>
-            <a:lvl1pPr algn="r">
-              <a:buNone/>
-              <a:defRPr b="0" lang="en-CA" sz="1400" spc="-1" strike="noStrike">
-                <a:latin typeface="Times New Roman"/>
-              </a:defRPr>
-            </a:lvl1pPr>
-          </a:lstStyle>
-          <a:p>
-            <a:pPr algn="r">
-              <a:buNone/>
-            </a:pPr>
-            <a:fld id="{01B5FC46-AF9F-4DDE-B773-7FA313C58967}" type="slidenum">
-              <a:rPr b="0" lang="en-CA" sz="1400" spc="-1" strike="noStrike">
-                <a:latin typeface="Times New Roman"/>
-              </a:rPr>
-              <a:t>&lt;number&gt;</a:t>
-            </a:fld>
-            <a:endParaRPr b="0" lang="en-CA" sz="1400" spc="-1" strike="noStrike">
-              <a:latin typeface="Times New Roman"/>
-            </a:endParaRPr>
+              <a:t>VP – Loan Regulation</a:t>
+            </a:r>
           </a:p>
         </p:txBody>
       </p:sp>
     </p:spTree>
   </p:cSld>
-  <p:clrMap bg1="lt1" bg2="lt2" tx1="dk1" tx2="dk2" accent1="accent1" accent2="accent2" accent3="accent3" accent4="accent4" accent5="accent5" accent6="accent6" hlink="hlink" folHlink="folHlink"/>
-  <p:sldLayoutIdLst>
-    <p:sldLayoutId id="2147483649" r:id="rId2"/>
-    <p:sldLayoutId id="2147483650" r:id="rId3"/>
-    <p:sldLayoutId id="2147483651" r:id="rId4"/>
-    <p:sldLayoutId id="2147483652" r:id="rId5"/>
-    <p:sldLayoutId id="2147483653" r:id="rId6"/>
-    <p:sldLayoutId id="2147483654" r:id="rId7"/>
-    <p:sldLayoutId id="2147483655" r:id="rId8"/>
-    <p:sldLayoutId id="2147483656" r:id="rId9"/>
-    <p:sldLayoutId id="2147483657" r:id="rId10"/>
-    <p:sldLayoutId id="2147483658" r:id="rId11"/>
-    <p:sldLayoutId id="2147483659" r:id="rId12"/>
-    <p:sldLayoutId id="2147483660" r:id="rId13"/>
-  </p:sldLayoutIdLst>
-</p:sldMaster>
+  <p:clrMapOvr>
+    <a:masterClrMapping/>
+  </p:clrMapOvr>
+</p:sld>
 </file>
 
-<file path=ppt/slides/slide1.xml><?xml version="1.0" encoding="utf-8"?>
-<p:sld xmlns:a="http://schemas.openxmlformats.org/drawingml/2006/main" xmlns:p="http://schemas.openxmlformats.org/presentationml/2006/main" xmlns:r="http://schemas.openxmlformats.org/officeDocument/2006/relationships" xmlns:p14="http://schemas.microsoft.com/office/powerpoint/2010/main" xmlns:p15="http://schemas.microsoft.com/office/powerpoint/2012/main" xmlns:mc="http://schemas.openxmlformats.org/markup-compatibility/2006">
+<file path=ppt/slides/slide2.xml><?xml version="1.0" encoding="utf-8"?>
+<p:sld xmlns:a="http://schemas.openxmlformats.org/drawingml/2006/main" xmlns:r="http://schemas.openxmlformats.org/officeDocument/2006/relationships" xmlns:p="http://schemas.openxmlformats.org/presentationml/2006/main">
   <p:cSld>
     <p:spTree>
       <p:nvGrpSpPr>
@@ -2702,7 +3256,7 @@
       </p:grpSpPr>
       <p:sp>
         <p:nvSpPr>
-          <p:cNvPr id="41" name="PlaceHolder 1"/>
+          <p:cNvPr id="43" name="PlaceHolder 1"/>
           <p:cNvSpPr>
             <a:spLocks noGrp="1"/>
           </p:cNvSpPr>
@@ -2724,38 +3278,36 @@
           </a:ln>
         </p:spPr>
         <p:txBody>
-          <a:bodyPr lIns="0" rIns="0" tIns="0" bIns="0" anchor="ctr">
+          <a:bodyPr lIns="0" tIns="0" rIns="0" bIns="0" anchor="ctr">
             <a:noAutofit/>
           </a:bodyPr>
+          <a:lstStyle/>
           <a:p>
             <a:pPr algn="ctr">
               <a:buNone/>
             </a:pPr>
             <a:r>
-              <a:rPr b="0" lang="en-CA" sz="4400" spc="-1" strike="noStrike">
+              <a:rPr lang="en-CA" sz="3200" b="0" strike="noStrike" spc="-1">
                 <a:latin typeface="Arial"/>
               </a:rPr>
-              <a:t>Loan Fast Approval</a:t>
-            </a:r>
-            <a:endParaRPr b="0" lang="en-CA" sz="4400" spc="-1" strike="noStrike">
-              <a:latin typeface="Arial"/>
-            </a:endParaRPr>
-          </a:p>
-        </p:txBody>
-      </p:sp>
-      <p:sp>
-        <p:nvSpPr>
-          <p:cNvPr id="42" name="PlaceHolder 2"/>
-          <p:cNvSpPr>
-            <a:spLocks noGrp="1"/>
-          </p:cNvSpPr>
-          <p:nvPr>
-            <p:ph type="subTitle"/>
-          </p:nvPr>
-        </p:nvSpPr>
-        <p:spPr>
-          <a:xfrm>
-            <a:off x="504000" y="1326600"/>
+              <a:t>Can a model predict loan approvals?</a:t>
+            </a:r>
+          </a:p>
+        </p:txBody>
+      </p:sp>
+      <p:sp>
+        <p:nvSpPr>
+          <p:cNvPr id="44" name="PlaceHolder 2"/>
+          <p:cNvSpPr>
+            <a:spLocks noGrp="1"/>
+          </p:cNvSpPr>
+          <p:nvPr>
+            <p:ph/>
+          </p:nvPr>
+        </p:nvSpPr>
+        <p:spPr>
+          <a:xfrm>
+            <a:off x="504000" y="1324440"/>
             <a:ext cx="9071640" cy="3288240"/>
           </a:xfrm>
           <a:prstGeom prst="rect">
@@ -2767,54 +3319,115 @@
           </a:ln>
         </p:spPr>
         <p:txBody>
-          <a:bodyPr lIns="0" rIns="0" tIns="0" bIns="0" anchor="ctr">
-            <a:noAutofit/>
-          </a:bodyPr>
-          <a:p>
-            <a:pPr algn="ctr">
-              <a:buNone/>
-            </a:pPr>
-            <a:r>
-              <a:rPr b="0" lang="en-CA" sz="3200" spc="-1" strike="noStrike">
+          <a:bodyPr lIns="0" tIns="0" rIns="0" bIns="0" anchor="t">
+            <a:normAutofit fontScale="85500" lnSpcReduction="20000"/>
+          </a:bodyPr>
+          <a:lstStyle/>
+          <a:p>
+            <a:pPr marL="432000" indent="-324000">
+              <a:spcBef>
+                <a:spcPts val="1417"/>
+              </a:spcBef>
+              <a:buClr>
+                <a:srgbClr val="000000"/>
+              </a:buClr>
+              <a:buSzPct val="45000"/>
+              <a:buFont typeface="Wingdings" charset="2"/>
+              <a:buChar char=""/>
+            </a:pPr>
+            <a:r>
+              <a:rPr lang="en-CA" sz="2400" b="0" strike="noStrike" spc="-1" dirty="0">
                 <a:latin typeface="Arial"/>
               </a:rPr>
-              <a:t>Is it possible?</a:t>
-            </a:r>
-            <a:endParaRPr b="0" lang="en-CA" sz="3200" spc="-1" strike="noStrike">
-              <a:latin typeface="Arial"/>
-            </a:endParaRPr>
-          </a:p>
-          <a:p>
-            <a:pPr algn="ctr">
-              <a:buNone/>
-            </a:pPr>
-            <a:r>
-              <a:rPr b="0" lang="en-CA" sz="3200" spc="-1" strike="noStrike">
+              <a:t>Yes! Our internal analysis indicates that a machine learning (ML) model can accurately, but not perfectly, approve or reject a loan.</a:t>
+            </a:r>
+          </a:p>
+          <a:p>
+            <a:pPr marL="432000" indent="-324000">
+              <a:spcBef>
+                <a:spcPts val="1417"/>
+              </a:spcBef>
+              <a:buClr>
+                <a:srgbClr val="000000"/>
+              </a:buClr>
+              <a:buSzPct val="45000"/>
+              <a:buFont typeface="Wingdings" charset="2"/>
+              <a:buChar char=""/>
+            </a:pPr>
+            <a:r>
+              <a:rPr lang="en-CA" sz="2400" b="0" strike="noStrike" spc="-1" dirty="0">
                 <a:latin typeface="Arial"/>
               </a:rPr>
-              <a:t>VP – Loan Regulation</a:t>
-            </a:r>
-            <a:endParaRPr b="0" lang="en-CA" sz="3200" spc="-1" strike="noStrike">
-              <a:latin typeface="Arial"/>
-            </a:endParaRPr>
+              <a:t>Based on the input data, there are 52 “features” that human loan officers take into consideration. 52 features is a lot for a ML model, and this number can increase depending on if feature engineering, encoding, or interaction features </a:t>
+            </a:r>
+            <a:r>
+              <a:rPr lang="en-CA" sz="2400" spc="-1" dirty="0">
+                <a:latin typeface="Arial"/>
+              </a:rPr>
+              <a:t>are added to </a:t>
+            </a:r>
+            <a:r>
+              <a:rPr lang="en-CA" sz="2400" b="0" strike="noStrike" spc="-1" dirty="0">
+                <a:latin typeface="Arial"/>
+              </a:rPr>
+              <a:t>the data prior to model training. ML is most accurate when using the smallest amount of relevant/best variables. The solution to this dilemma is called feature selection.</a:t>
+            </a:r>
+          </a:p>
+          <a:p>
+            <a:pPr marL="432000" indent="-324000">
+              <a:spcBef>
+                <a:spcPts val="1417"/>
+              </a:spcBef>
+              <a:buClr>
+                <a:srgbClr val="000000"/>
+              </a:buClr>
+              <a:buSzPct val="45000"/>
+              <a:buFont typeface="Wingdings" charset="2"/>
+              <a:buChar char=""/>
+            </a:pPr>
+            <a:r>
+              <a:rPr lang="en-CA" sz="2400" b="0" strike="noStrike" spc="-1" dirty="0">
+                <a:latin typeface="Arial"/>
+              </a:rPr>
+              <a:t>The large dataset needs a solution that </a:t>
+            </a:r>
+            <a:r>
+              <a:rPr lang="en-CA" sz="2400" spc="-1" dirty="0">
+                <a:latin typeface="Arial"/>
+              </a:rPr>
+              <a:t>can automatically select which features are appropriate for predicting the loan outcome. This provides for better predictions and less bias associated with manually choosing what features are important. Two approaches,</a:t>
+            </a:r>
+            <a:r>
+              <a:rPr lang="en-CA" sz="2400" b="0" strike="noStrike" spc="-1" dirty="0">
+                <a:latin typeface="Arial"/>
+              </a:rPr>
+              <a:t> stepwise forward selection </a:t>
+            </a:r>
+            <a:r>
+              <a:rPr lang="en-CA" sz="2400" spc="-1" dirty="0">
+                <a:latin typeface="Arial"/>
+              </a:rPr>
+              <a:t>and</a:t>
+            </a:r>
+            <a:r>
+              <a:rPr lang="en-CA" sz="2400" b="0" strike="noStrike" spc="-1" dirty="0">
+                <a:latin typeface="Arial"/>
+              </a:rPr>
+              <a:t> LASSO. </a:t>
+            </a:r>
           </a:p>
         </p:txBody>
       </p:sp>
     </p:spTree>
   </p:cSld>
-  <mc:AlternateContent>
-    <mc:Choice Requires="p14">
-      <p:transition spd="slow" p14:dur="2000"/>
-    </mc:Choice>
-    <mc:Fallback>
-      <p:transition spd="slow"/>
-    </mc:Fallback>
-  </mc:AlternateContent>
+  <p:clrMapOvr>
+    <a:masterClrMapping/>
+  </p:clrMapOvr>
 </p:sld>
 </file>
 
-<file path=ppt/slides/slide2.xml><?xml version="1.0" encoding="utf-8"?>
-<p:sld xmlns:a="http://schemas.openxmlformats.org/drawingml/2006/main" xmlns:p="http://schemas.openxmlformats.org/presentationml/2006/main" xmlns:r="http://schemas.openxmlformats.org/officeDocument/2006/relationships" xmlns:p14="http://schemas.microsoft.com/office/powerpoint/2010/main" xmlns:p15="http://schemas.microsoft.com/office/powerpoint/2012/main" xmlns:mc="http://schemas.openxmlformats.org/markup-compatibility/2006">
+<file path=ppt/slides/slide3.xml><?xml version="1.0" encoding="utf-8"?>
+<p:sld xmlns:a="http://schemas.openxmlformats.org/drawingml/2006/main" xmlns:r="http://schemas.openxmlformats.org/officeDocument/2006/relationships" xmlns:p="http://schemas.openxmlformats.org/presentationml/2006/main">
   <p:cSld>
     <p:spTree>
       <p:nvGrpSpPr>
@@ -2832,7 +3445,7 @@
       </p:grpSpPr>
       <p:sp>
         <p:nvSpPr>
-          <p:cNvPr id="43" name="PlaceHolder 1"/>
+          <p:cNvPr id="45" name="PlaceHolder 1"/>
           <p:cNvSpPr>
             <a:spLocks noGrp="1"/>
           </p:cNvSpPr>
@@ -2854,28 +3467,26 @@
           </a:ln>
         </p:spPr>
         <p:txBody>
-          <a:bodyPr lIns="0" rIns="0" tIns="0" bIns="0" anchor="ctr">
+          <a:bodyPr lIns="0" tIns="0" rIns="0" bIns="0" anchor="ctr">
             <a:noAutofit/>
           </a:bodyPr>
+          <a:lstStyle/>
           <a:p>
             <a:pPr algn="ctr">
               <a:buNone/>
             </a:pPr>
             <a:r>
-              <a:rPr b="0" lang="en-CA" sz="3200" spc="-1" strike="noStrike">
+              <a:rPr lang="en-CA" sz="4400" b="0" strike="noStrike" spc="-1">
                 <a:latin typeface="Arial"/>
               </a:rPr>
-              <a:t>Can a model predict loan approvals?</a:t>
-            </a:r>
-            <a:endParaRPr b="0" lang="en-CA" sz="3200" spc="-1" strike="noStrike">
-              <a:latin typeface="Arial"/>
-            </a:endParaRPr>
-          </a:p>
-        </p:txBody>
-      </p:sp>
-      <p:sp>
-        <p:nvSpPr>
-          <p:cNvPr id="44" name="PlaceHolder 2"/>
+              <a:t>Which model is the best?</a:t>
+            </a:r>
+          </a:p>
+        </p:txBody>
+      </p:sp>
+      <p:sp>
+        <p:nvSpPr>
+          <p:cNvPr id="46" name="PlaceHolder 2"/>
           <p:cNvSpPr>
             <a:spLocks noGrp="1"/>
           </p:cNvSpPr>
@@ -2885,7 +3496,7 @@
         </p:nvSpPr>
         <p:spPr>
           <a:xfrm>
-            <a:off x="504000" y="1324440"/>
+            <a:off x="504000" y="1326600"/>
             <a:ext cx="9071640" cy="3288240"/>
           </a:xfrm>
           <a:prstGeom prst="rect">
@@ -2897,9 +3508,10 @@
           </a:ln>
         </p:spPr>
         <p:txBody>
-          <a:bodyPr lIns="0" rIns="0" tIns="0" bIns="0" anchor="t">
-            <a:normAutofit fontScale="78000"/>
-          </a:bodyPr>
+          <a:bodyPr lIns="0" tIns="0" rIns="0" bIns="0" anchor="t">
+            <a:normAutofit fontScale="75500" lnSpcReduction="20000"/>
+          </a:bodyPr>
+          <a:lstStyle/>
           <a:p>
             <a:pPr marL="432000" indent="-324000">
               <a:spcBef>
@@ -2913,26 +3525,11 @@
               <a:buChar char=""/>
             </a:pPr>
             <a:r>
-              <a:rPr b="0" lang="en-CA" sz="2400" spc="-1" strike="noStrike">
+              <a:rPr lang="en-CA" sz="3200" b="0" strike="noStrike" spc="-1" dirty="0">
                 <a:latin typeface="Arial"/>
               </a:rPr>
-              <a:t>Yes! Our internal analysis indicates that a machine learning </a:t>
-            </a:r>
-            <a:r>
-              <a:rPr b="0" lang="en-CA" sz="2400" spc="-1" strike="noStrike">
-                <a:latin typeface="Arial"/>
-              </a:rPr>
-              <a:t>(ML) model can accurately, but not perfectly, approve or reject </a:t>
-            </a:r>
-            <a:r>
-              <a:rPr b="0" lang="en-CA" sz="2400" spc="-1" strike="noStrike">
-                <a:latin typeface="Arial"/>
-              </a:rPr>
-              <a:t>a loan.</a:t>
-            </a:r>
-            <a:endParaRPr b="0" lang="en-CA" sz="2400" spc="-1" strike="noStrike">
-              <a:latin typeface="Arial"/>
-            </a:endParaRPr>
+              <a:t>A loan approval or rejection has major implications in a persons life, and banking/loans carry significant regulatory and legal implications. Only a highly accurate model should be selected.</a:t>
+            </a:r>
           </a:p>
           <a:p>
             <a:pPr marL="432000" indent="-324000">
@@ -2947,50 +3544,59 @@
               <a:buChar char=""/>
             </a:pPr>
             <a:r>
-              <a:rPr b="0" lang="en-CA" sz="2400" spc="-1" strike="noStrike">
+              <a:rPr lang="en-CA" sz="3200" b="0" strike="noStrike" spc="-1" dirty="0">
                 <a:latin typeface="Arial"/>
               </a:rPr>
-              <a:t>Based on the input data, there are 52 “features” that human </a:t>
-            </a:r>
-            <a:r>
-              <a:rPr b="0" lang="en-CA" sz="2400" spc="-1" strike="noStrike">
+              <a:t>Based on the problem and the dataset, two models were trained and evaluated. </a:t>
+            </a:r>
+          </a:p>
+          <a:p>
+            <a:pPr marL="108000">
+              <a:spcBef>
+                <a:spcPts val="1417"/>
+              </a:spcBef>
+              <a:buClr>
+                <a:srgbClr val="000000"/>
+              </a:buClr>
+              <a:buSzPct val="45000"/>
+            </a:pPr>
+            <a:r>
+              <a:rPr lang="en-CA" sz="3200" b="0" strike="noStrike" spc="-1" dirty="0">
                 <a:latin typeface="Arial"/>
               </a:rPr>
-              <a:t>loan officers take into consideration. 52 features is a lot for a </a:t>
-            </a:r>
-            <a:r>
-              <a:rPr b="0" lang="en-CA" sz="2400" spc="-1" strike="noStrike">
+              <a:t>	1) logistic regression with stepwise forward selection</a:t>
+            </a:r>
+          </a:p>
+          <a:p>
+            <a:pPr marL="108000">
+              <a:spcBef>
+                <a:spcPts val="1417"/>
+              </a:spcBef>
+              <a:buClr>
+                <a:srgbClr val="000000"/>
+              </a:buClr>
+              <a:buSzPct val="45000"/>
+            </a:pPr>
+            <a:r>
+              <a:rPr lang="en-CA" sz="3200" spc="-1" dirty="0">
+                <a:latin typeface="Arial"/>
+                <a:ea typeface="Noto Sans CJK SC"/>
+              </a:rPr>
+              <a:t>	</a:t>
+            </a:r>
+            <a:r>
+              <a:rPr lang="en-CA" sz="3200" b="0" strike="noStrike" spc="-1" dirty="0">
+                <a:latin typeface="Arial"/>
+                <a:ea typeface="Noto Sans CJK SC"/>
+              </a:rPr>
+              <a:t>2) </a:t>
+            </a:r>
+            <a:r>
+              <a:rPr lang="en-CA" sz="3200" b="0" strike="noStrike" spc="-1" dirty="0">
                 <a:latin typeface="Arial"/>
               </a:rPr>
-              <a:t>ML model, and this number can increase depending on if </a:t>
-            </a:r>
-            <a:r>
-              <a:rPr b="0" lang="en-CA" sz="2400" spc="-1" strike="noStrike">
-                <a:latin typeface="Arial"/>
-              </a:rPr>
-              <a:t>feature engineering, encoding, or interaction features used on </a:t>
-            </a:r>
-            <a:r>
-              <a:rPr b="0" lang="en-CA" sz="2400" spc="-1" strike="noStrike">
-                <a:latin typeface="Arial"/>
-              </a:rPr>
-              <a:t>the data prior to model training. ML is most accurate when </a:t>
-            </a:r>
-            <a:r>
-              <a:rPr b="0" lang="en-CA" sz="2400" spc="-1" strike="noStrike">
-                <a:latin typeface="Arial"/>
-              </a:rPr>
-              <a:t>using the smallest amount of relevant/best variables. The </a:t>
-            </a:r>
-            <a:r>
-              <a:rPr b="0" lang="en-CA" sz="2400" spc="-1" strike="noStrike">
-                <a:latin typeface="Arial"/>
-              </a:rPr>
-              <a:t>solution to this dilemma is called “feature selection”. </a:t>
-            </a:r>
-            <a:endParaRPr b="0" lang="en-CA" sz="2400" spc="-1" strike="noStrike">
-              <a:latin typeface="Arial"/>
-            </a:endParaRPr>
+              <a:t>Logistic regression LASSO with cross validation</a:t>
+            </a:r>
           </a:p>
           <a:p>
             <a:pPr marL="432000" indent="-324000">
@@ -3005,62 +3611,24 @@
               <a:buChar char=""/>
             </a:pPr>
             <a:r>
-              <a:rPr b="0" lang="en-CA" sz="2400" spc="-1" strike="noStrike">
+              <a:rPr lang="en-CA" sz="3200" b="0" strike="noStrike" spc="-1" dirty="0">
                 <a:latin typeface="Arial"/>
               </a:rPr>
-              <a:t>This problem lends itself well to an automated feature selection </a:t>
-            </a:r>
-            <a:r>
-              <a:rPr b="0" lang="en-CA" sz="2400" spc="-1" strike="noStrike">
-                <a:latin typeface="Arial"/>
-              </a:rPr>
-              <a:t>method such as stepwise forward selection or LASSO. These </a:t>
-            </a:r>
-            <a:r>
-              <a:rPr b="0" lang="en-CA" sz="2400" spc="-1" strike="noStrike">
-                <a:latin typeface="Arial"/>
-              </a:rPr>
-              <a:t>methods automatically include the best features, which helps </a:t>
-            </a:r>
-            <a:r>
-              <a:rPr b="0" lang="en-CA" sz="2400" spc="-1" strike="noStrike">
-                <a:latin typeface="Arial"/>
-              </a:rPr>
-              <a:t>increase the accuracy, while also reducing the human bias </a:t>
-            </a:r>
-            <a:r>
-              <a:rPr b="0" lang="en-CA" sz="2400" spc="-1" strike="noStrike">
-                <a:latin typeface="Arial"/>
-              </a:rPr>
-              <a:t>associated with manually choosing which features to use in the </a:t>
-            </a:r>
-            <a:r>
-              <a:rPr b="0" lang="en-CA" sz="2400" spc="-1" strike="noStrike">
-                <a:latin typeface="Arial"/>
-              </a:rPr>
-              <a:t>model.</a:t>
-            </a:r>
-            <a:endParaRPr b="0" lang="en-CA" sz="2400" spc="-1" strike="noStrike">
-              <a:latin typeface="Arial"/>
-            </a:endParaRPr>
+              <a:t>Model 2 produced high (&gt;0.99) accuracy, precision, recall, and AUC scores in the model test data.</a:t>
+            </a:r>
           </a:p>
         </p:txBody>
       </p:sp>
     </p:spTree>
   </p:cSld>
-  <mc:AlternateContent>
-    <mc:Choice Requires="p14">
-      <p:transition spd="slow" p14:dur="2000"/>
-    </mc:Choice>
-    <mc:Fallback>
-      <p:transition spd="slow"/>
-    </mc:Fallback>
-  </mc:AlternateContent>
+  <p:clrMapOvr>
+    <a:masterClrMapping/>
+  </p:clrMapOvr>
 </p:sld>
 </file>
 
-<file path=ppt/slides/slide3.xml><?xml version="1.0" encoding="utf-8"?>
-<p:sld xmlns:a="http://schemas.openxmlformats.org/drawingml/2006/main" xmlns:p="http://schemas.openxmlformats.org/presentationml/2006/main" xmlns:r="http://schemas.openxmlformats.org/officeDocument/2006/relationships" xmlns:p14="http://schemas.microsoft.com/office/powerpoint/2010/main" xmlns:p15="http://schemas.microsoft.com/office/powerpoint/2012/main" xmlns:mc="http://schemas.openxmlformats.org/markup-compatibility/2006">
+<file path=ppt/slides/slide4.xml><?xml version="1.0" encoding="utf-8"?>
+<p:sld xmlns:a="http://schemas.openxmlformats.org/drawingml/2006/main" xmlns:r="http://schemas.openxmlformats.org/officeDocument/2006/relationships" xmlns:p="http://schemas.openxmlformats.org/presentationml/2006/main">
   <p:cSld>
     <p:spTree>
       <p:nvGrpSpPr>
@@ -3078,7 +3646,7 @@
       </p:grpSpPr>
       <p:sp>
         <p:nvSpPr>
-          <p:cNvPr id="45" name="PlaceHolder 1"/>
+          <p:cNvPr id="47" name="PlaceHolder 1"/>
           <p:cNvSpPr>
             <a:spLocks noGrp="1"/>
           </p:cNvSpPr>
@@ -3088,40 +3656,38 @@
         </p:nvSpPr>
         <p:spPr>
           <a:xfrm>
-            <a:off x="504000" y="226080"/>
-            <a:ext cx="9071640" cy="946440"/>
-          </a:xfrm>
-          <a:prstGeom prst="rect">
-            <a:avLst/>
-          </a:prstGeom>
-          <a:noFill/>
-          <a:ln w="0">
-            <a:noFill/>
-          </a:ln>
-        </p:spPr>
-        <p:txBody>
-          <a:bodyPr lIns="0" rIns="0" tIns="0" bIns="0" anchor="ctr">
+            <a:off x="504000" y="74160"/>
+            <a:ext cx="9071640" cy="1250280"/>
+          </a:xfrm>
+          <a:prstGeom prst="rect">
+            <a:avLst/>
+          </a:prstGeom>
+          <a:noFill/>
+          <a:ln w="0">
+            <a:noFill/>
+          </a:ln>
+        </p:spPr>
+        <p:txBody>
+          <a:bodyPr lIns="0" tIns="0" rIns="0" bIns="0" anchor="ctr">
             <a:noAutofit/>
           </a:bodyPr>
+          <a:lstStyle/>
           <a:p>
             <a:pPr algn="ctr">
               <a:buNone/>
             </a:pPr>
             <a:r>
-              <a:rPr b="0" lang="en-CA" sz="4400" spc="-1" strike="noStrike">
+              <a:rPr lang="en-CA" sz="4400" b="0" strike="noStrike" spc="-1">
                 <a:latin typeface="Arial"/>
               </a:rPr>
-              <a:t>Which model is the best?</a:t>
-            </a:r>
-            <a:endParaRPr b="0" lang="en-CA" sz="4400" spc="-1" strike="noStrike">
-              <a:latin typeface="Arial"/>
-            </a:endParaRPr>
-          </a:p>
-        </p:txBody>
-      </p:sp>
-      <p:sp>
-        <p:nvSpPr>
-          <p:cNvPr id="46" name="PlaceHolder 2"/>
+              <a:t>Should a model be built and deployed?</a:t>
+            </a:r>
+          </a:p>
+        </p:txBody>
+      </p:sp>
+      <p:sp>
+        <p:nvSpPr>
+          <p:cNvPr id="48" name="PlaceHolder 2"/>
           <p:cNvSpPr>
             <a:spLocks noGrp="1"/>
           </p:cNvSpPr>
@@ -3143,9 +3709,10 @@
           </a:ln>
         </p:spPr>
         <p:txBody>
-          <a:bodyPr lIns="0" rIns="0" tIns="0" bIns="0" anchor="t">
-            <a:normAutofit fontScale="68000"/>
-          </a:bodyPr>
+          <a:bodyPr lIns="0" tIns="0" rIns="0" bIns="0" anchor="t">
+            <a:normAutofit fontScale="40000" lnSpcReduction="20000"/>
+          </a:bodyPr>
+          <a:lstStyle/>
           <a:p>
             <a:pPr marL="432000" indent="-324000">
               <a:spcBef>
@@ -3159,38 +3726,11 @@
               <a:buChar char=""/>
             </a:pPr>
             <a:r>
-              <a:rPr b="0" lang="en-CA" sz="3200" spc="-1" strike="noStrike">
+              <a:rPr lang="en-CA" sz="3200" b="0" strike="noStrike" spc="-1">
                 <a:latin typeface="Arial"/>
               </a:rPr>
-              <a:t>A loan approval or rejection has major </a:t>
-            </a:r>
-            <a:r>
-              <a:rPr b="0" lang="en-CA" sz="3200" spc="-1" strike="noStrike">
-                <a:latin typeface="Arial"/>
-              </a:rPr>
-              <a:t>implications in a persons life, and </a:t>
-            </a:r>
-            <a:r>
-              <a:rPr b="0" lang="en-CA" sz="3200" spc="-1" strike="noStrike">
-                <a:latin typeface="Arial"/>
-              </a:rPr>
-              <a:t>banking/loans carry significant regulatory and </a:t>
-            </a:r>
-            <a:r>
-              <a:rPr b="0" lang="en-CA" sz="3200" spc="-1" strike="noStrike">
-                <a:latin typeface="Arial"/>
-              </a:rPr>
-              <a:t>legal implications. Only a highly accurate </a:t>
-            </a:r>
-            <a:r>
-              <a:rPr b="0" lang="en-CA" sz="3200" spc="-1" strike="noStrike">
-                <a:latin typeface="Arial"/>
-              </a:rPr>
-              <a:t>model should be selected.</a:t>
-            </a:r>
-            <a:endParaRPr b="0" lang="en-CA" sz="3200" spc="-1" strike="noStrike">
-              <a:latin typeface="Arial"/>
-            </a:endParaRPr>
+              <a:t>No. Not until steps have been taken to minimize algorithmic bias.</a:t>
+            </a:r>
           </a:p>
           <a:p>
             <a:pPr marL="432000" indent="-324000">
@@ -3205,20 +3745,11 @@
               <a:buChar char=""/>
             </a:pPr>
             <a:r>
-              <a:rPr b="0" lang="en-CA" sz="3200" spc="-1" strike="noStrike">
+              <a:rPr lang="en-CA" sz="3200" b="0" strike="noStrike" spc="-1">
                 <a:latin typeface="Arial"/>
               </a:rPr>
-              <a:t>Based on the problem and the dataset, two </a:t>
-            </a:r>
-            <a:r>
-              <a:rPr b="0" lang="en-CA" sz="3200" spc="-1" strike="noStrike">
-                <a:latin typeface="Arial"/>
-              </a:rPr>
-              <a:t>models were trained and evaluated. </a:t>
-            </a:r>
-            <a:endParaRPr b="0" lang="en-CA" sz="3200" spc="-1" strike="noStrike">
-              <a:latin typeface="Arial"/>
-            </a:endParaRPr>
+              <a:t>The dataset used to train the model comes from real loans issued by financial institutions. The Fair Housing Act and the Equal Credit Opportunity Act, prohibit financial institutions from discriminating on the basis of race, sex or national origin in their mortgage lending services. However these acts have a history of being violated. An algorithm trained on illegal, or unethical, loans will learn those biases and use them on forward looking predictions. </a:t>
+            </a:r>
           </a:p>
           <a:p>
             <a:pPr marL="432000" indent="-324000">
@@ -3233,20 +3764,11 @@
               <a:buChar char=""/>
             </a:pPr>
             <a:r>
-              <a:rPr b="0" lang="en-CA" sz="3200" spc="-1" strike="noStrike">
+              <a:rPr lang="en-CA" sz="3200" b="0" strike="noStrike" spc="-1">
                 <a:latin typeface="Arial"/>
               </a:rPr>
-              <a:t>1) logistic regression with stepwise forward </a:t>
-            </a:r>
-            <a:r>
-              <a:rPr b="0" lang="en-CA" sz="3200" spc="-1" strike="noStrike">
-                <a:latin typeface="Arial"/>
-              </a:rPr>
-              <a:t>selection</a:t>
-            </a:r>
-            <a:endParaRPr b="0" lang="en-CA" sz="3200" spc="-1" strike="noStrike">
-              <a:latin typeface="Arial"/>
-            </a:endParaRPr>
+              <a:t>Prior to model training, bias should be removed from the data. This can be done in two steps. </a:t>
+            </a:r>
           </a:p>
           <a:p>
             <a:pPr marL="432000" indent="-324000">
@@ -3261,27 +3783,18 @@
               <a:buChar char=""/>
             </a:pPr>
             <a:r>
-              <a:rPr b="0" lang="en-CA" sz="3200" spc="-1" strike="noStrike">
+              <a:rPr lang="en-CA" sz="3200" b="0" strike="noStrike" spc="-1">
                 <a:latin typeface="Arial"/>
                 <a:ea typeface="Noto Sans CJK SC"/>
               </a:rPr>
-              <a:t>2) </a:t>
-            </a:r>
-            <a:r>
-              <a:rPr b="0" lang="en-CA" sz="3200" spc="-1" strike="noStrike">
+              <a:t>1. Remove explicit bias. Ask financial institutions to re-submit data, and only include loans that were not found by the Justice Department to be in violation of </a:t>
+            </a:r>
+            <a:r>
+              <a:rPr lang="en-CA" sz="3200" b="0" strike="noStrike" spc="-1">
                 <a:latin typeface="Arial"/>
               </a:rPr>
-              <a:t>Logistic regression LASSO with cross </a:t>
-            </a:r>
-            <a:r>
-              <a:rPr b="0" lang="en-CA" sz="3200" spc="-1" strike="noStrike">
-                <a:latin typeface="Arial"/>
-              </a:rPr>
-              <a:t>validation</a:t>
-            </a:r>
-            <a:endParaRPr b="0" lang="en-CA" sz="3200" spc="-1" strike="noStrike">
-              <a:latin typeface="Arial"/>
-            </a:endParaRPr>
+              <a:t>The Fair Housing Act and the Equal Credit Opportunity Act.</a:t>
+            </a:r>
           </a:p>
           <a:p>
             <a:pPr marL="432000" indent="-324000">
@@ -3296,129 +3809,19 @@
               <a:buChar char=""/>
             </a:pPr>
             <a:r>
-              <a:rPr b="0" lang="en-CA" sz="3200" spc="-1" strike="noStrike">
+              <a:rPr lang="en-CA" sz="3200" b="0" strike="noStrike" spc="-1">
+                <a:latin typeface="Arial"/>
+                <a:ea typeface="Noto Sans CJK SC"/>
+              </a:rPr>
+              <a:t>2. Remove implicit bias. Ask financial institutions to re-submit data, but with features corresponding to race, sex, and National Origin. Data Science methods can then be used to automatically eliminate any features/dependent variables that correspond significantly with race, sex, and National Origin. Models should also be built for each reported category of </a:t>
+            </a:r>
+            <a:r>
+              <a:rPr lang="en-CA" sz="3200" b="0" strike="noStrike" spc="-1">
                 <a:latin typeface="Arial"/>
               </a:rPr>
-              <a:t>Model 2 produced high (&gt;0.99) accuracy, </a:t>
-            </a:r>
-            <a:r>
-              <a:rPr b="0" lang="en-CA" sz="3200" spc="-1" strike="noStrike">
-                <a:latin typeface="Arial"/>
-              </a:rPr>
-              <a:t>precision, recall, and AUC scores in the model </a:t>
-            </a:r>
-            <a:r>
-              <a:rPr b="0" lang="en-CA" sz="3200" spc="-1" strike="noStrike">
-                <a:latin typeface="Arial"/>
-              </a:rPr>
-              <a:t>test data.</a:t>
-            </a:r>
-            <a:endParaRPr b="0" lang="en-CA" sz="3200" spc="-1" strike="noStrike">
-              <a:latin typeface="Arial"/>
-            </a:endParaRPr>
-          </a:p>
-        </p:txBody>
-      </p:sp>
-    </p:spTree>
-  </p:cSld>
-  <mc:AlternateContent>
-    <mc:Choice Requires="p14">
-      <p:transition spd="slow" p14:dur="2000"/>
-    </mc:Choice>
-    <mc:Fallback>
-      <p:transition spd="slow"/>
-    </mc:Fallback>
-  </mc:AlternateContent>
-</p:sld>
-</file>
-
-<file path=ppt/slides/slide4.xml><?xml version="1.0" encoding="utf-8"?>
-<p:sld xmlns:a="http://schemas.openxmlformats.org/drawingml/2006/main" xmlns:p="http://schemas.openxmlformats.org/presentationml/2006/main" xmlns:r="http://schemas.openxmlformats.org/officeDocument/2006/relationships" xmlns:p14="http://schemas.microsoft.com/office/powerpoint/2010/main" xmlns:p15="http://schemas.microsoft.com/office/powerpoint/2012/main" xmlns:mc="http://schemas.openxmlformats.org/markup-compatibility/2006">
-  <p:cSld>
-    <p:spTree>
-      <p:nvGrpSpPr>
-        <p:cNvPr id="1" name=""/>
-        <p:cNvGrpSpPr/>
-        <p:nvPr/>
-      </p:nvGrpSpPr>
-      <p:grpSpPr>
-        <a:xfrm>
-          <a:off x="0" y="0"/>
-          <a:ext cx="0" cy="0"/>
-          <a:chOff x="0" y="0"/>
-          <a:chExt cx="0" cy="0"/>
-        </a:xfrm>
-      </p:grpSpPr>
-      <p:sp>
-        <p:nvSpPr>
-          <p:cNvPr id="47" name="PlaceHolder 1"/>
-          <p:cNvSpPr>
-            <a:spLocks noGrp="1"/>
-          </p:cNvSpPr>
-          <p:nvPr>
-            <p:ph type="title"/>
-          </p:nvPr>
-        </p:nvSpPr>
-        <p:spPr>
-          <a:xfrm>
-            <a:off x="504000" y="74160"/>
-            <a:ext cx="9071640" cy="1250280"/>
-          </a:xfrm>
-          <a:prstGeom prst="rect">
-            <a:avLst/>
-          </a:prstGeom>
-          <a:noFill/>
-          <a:ln w="0">
-            <a:noFill/>
-          </a:ln>
-        </p:spPr>
-        <p:txBody>
-          <a:bodyPr lIns="0" rIns="0" tIns="0" bIns="0" anchor="ctr">
-            <a:noAutofit/>
-          </a:bodyPr>
-          <a:p>
-            <a:pPr algn="ctr">
-              <a:buNone/>
-            </a:pPr>
-            <a:r>
-              <a:rPr b="0" lang="en-CA" sz="4400" spc="-1" strike="noStrike">
-                <a:latin typeface="Arial"/>
-              </a:rPr>
-              <a:t>Should a model be built and deployed?</a:t>
-            </a:r>
-            <a:endParaRPr b="0" lang="en-CA" sz="4400" spc="-1" strike="noStrike">
-              <a:latin typeface="Arial"/>
-            </a:endParaRPr>
-          </a:p>
-        </p:txBody>
-      </p:sp>
-      <p:sp>
-        <p:nvSpPr>
-          <p:cNvPr id="48" name="PlaceHolder 2"/>
-          <p:cNvSpPr>
-            <a:spLocks noGrp="1"/>
-          </p:cNvSpPr>
-          <p:nvPr>
-            <p:ph/>
-          </p:nvPr>
-        </p:nvSpPr>
-        <p:spPr>
-          <a:xfrm>
-            <a:off x="504000" y="1326600"/>
-            <a:ext cx="9071640" cy="3288240"/>
-          </a:xfrm>
-          <a:prstGeom prst="rect">
-            <a:avLst/>
-          </a:prstGeom>
-          <a:noFill/>
-          <a:ln w="0">
-            <a:noFill/>
-          </a:ln>
-        </p:spPr>
-        <p:txBody>
-          <a:bodyPr lIns="0" rIns="0" tIns="0" bIns="0" anchor="t">
-            <a:normAutofit fontScale="40000"/>
-          </a:bodyPr>
+              <a:t>race, sex, and National Origin, and categories that significantly lie outside of average or expected loan outcome should have those records removed from the data</a:t>
+            </a:r>
+          </a:p>
           <a:p>
             <a:pPr marL="432000" indent="-324000">
               <a:spcBef>
@@ -3432,151 +3835,19 @@
               <a:buChar char=""/>
             </a:pPr>
             <a:r>
-              <a:rPr b="0" lang="en-CA" sz="3200" spc="-1" strike="noStrike">
-                <a:latin typeface="Arial"/>
-              </a:rPr>
-              <a:t>No. Not until steps have been taken to minimize algorithmic bias.</a:t>
-            </a:r>
-            <a:endParaRPr b="0" lang="en-CA" sz="3200" spc="-1" strike="noStrike">
-              <a:latin typeface="Arial"/>
-            </a:endParaRPr>
-          </a:p>
-          <a:p>
-            <a:pPr marL="432000" indent="-324000">
-              <a:spcBef>
-                <a:spcPts val="1417"/>
-              </a:spcBef>
-              <a:buClr>
-                <a:srgbClr val="000000"/>
-              </a:buClr>
-              <a:buSzPct val="45000"/>
-              <a:buFont typeface="Wingdings" charset="2"/>
-              <a:buChar char=""/>
-            </a:pPr>
-            <a:r>
-              <a:rPr b="0" lang="en-CA" sz="3200" spc="-1" strike="noStrike">
-                <a:latin typeface="Arial"/>
-              </a:rPr>
-              <a:t>The dataset used to train the model comes from real loans issued by financial institutions. The Fair Housing Act and the Equal Credit Opportunity Act, prohibit financial institutions from discriminating on the basis of race, sex or national origin in their mortgage lending services. However these acts have a history of being violated. An algorithm trained on illegal, or unethical, loans will learn those biases and use them on forward looking predictions. </a:t>
-            </a:r>
-            <a:endParaRPr b="0" lang="en-CA" sz="3200" spc="-1" strike="noStrike">
-              <a:latin typeface="Arial"/>
-            </a:endParaRPr>
-          </a:p>
-          <a:p>
-            <a:pPr marL="432000" indent="-324000">
-              <a:spcBef>
-                <a:spcPts val="1417"/>
-              </a:spcBef>
-              <a:buClr>
-                <a:srgbClr val="000000"/>
-              </a:buClr>
-              <a:buSzPct val="45000"/>
-              <a:buFont typeface="Wingdings" charset="2"/>
-              <a:buChar char=""/>
-            </a:pPr>
-            <a:r>
-              <a:rPr b="0" lang="en-CA" sz="3200" spc="-1" strike="noStrike">
-                <a:latin typeface="Arial"/>
-              </a:rPr>
-              <a:t>Prior to model training, bias should be removed from the data. This can be done in two steps. </a:t>
-            </a:r>
-            <a:endParaRPr b="0" lang="en-CA" sz="3200" spc="-1" strike="noStrike">
-              <a:latin typeface="Arial"/>
-            </a:endParaRPr>
-          </a:p>
-          <a:p>
-            <a:pPr marL="432000" indent="-324000">
-              <a:spcBef>
-                <a:spcPts val="1417"/>
-              </a:spcBef>
-              <a:buClr>
-                <a:srgbClr val="000000"/>
-              </a:buClr>
-              <a:buSzPct val="45000"/>
-              <a:buFont typeface="Wingdings" charset="2"/>
-              <a:buChar char=""/>
-            </a:pPr>
-            <a:r>
-              <a:rPr b="0" lang="en-CA" sz="3200" spc="-1" strike="noStrike">
-                <a:latin typeface="Arial"/>
-                <a:ea typeface="Noto Sans CJK SC"/>
-              </a:rPr>
-              <a:t>1. Remove explicit bias. Ask financial institutions to re-submit data, and only include loans that were not found by the Justice Department to be in violation of </a:t>
-            </a:r>
-            <a:r>
-              <a:rPr b="0" lang="en-CA" sz="3200" spc="-1" strike="noStrike">
-                <a:latin typeface="Arial"/>
-              </a:rPr>
-              <a:t>The Fair Housing Act and the Equal Credit Opportunity Act.</a:t>
-            </a:r>
-            <a:endParaRPr b="0" lang="en-CA" sz="3200" spc="-1" strike="noStrike">
-              <a:latin typeface="Arial"/>
-            </a:endParaRPr>
-          </a:p>
-          <a:p>
-            <a:pPr marL="432000" indent="-324000">
-              <a:spcBef>
-                <a:spcPts val="1417"/>
-              </a:spcBef>
-              <a:buClr>
-                <a:srgbClr val="000000"/>
-              </a:buClr>
-              <a:buSzPct val="45000"/>
-              <a:buFont typeface="Wingdings" charset="2"/>
-              <a:buChar char=""/>
-            </a:pPr>
-            <a:r>
-              <a:rPr b="0" lang="en-CA" sz="3200" spc="-1" strike="noStrike">
-                <a:latin typeface="Arial"/>
-                <a:ea typeface="Noto Sans CJK SC"/>
-              </a:rPr>
-              <a:t>2. Remove implicit bias. Ask financial institutions to re-submit data, but with features corresponding to race, sex, and National Origin. Data Science methods can then be used to automatically eliminate any features/dependent variables that correspond significantly with race, sex, and National Origin. Models should also be built for each reported category of </a:t>
-            </a:r>
-            <a:r>
-              <a:rPr b="0" lang="en-CA" sz="3200" spc="-1" strike="noStrike">
-                <a:latin typeface="Arial"/>
-              </a:rPr>
-              <a:t>race, sex, and National Origin, and categories that significantly lie outside of average or expected loan outcome should have those records removed from the data</a:t>
-            </a:r>
-            <a:endParaRPr b="0" lang="en-CA" sz="3200" spc="-1" strike="noStrike">
-              <a:latin typeface="Arial"/>
-            </a:endParaRPr>
-          </a:p>
-          <a:p>
-            <a:pPr marL="432000" indent="-324000">
-              <a:spcBef>
-                <a:spcPts val="1417"/>
-              </a:spcBef>
-              <a:buClr>
-                <a:srgbClr val="000000"/>
-              </a:buClr>
-              <a:buSzPct val="45000"/>
-              <a:buFont typeface="Wingdings" charset="2"/>
-              <a:buChar char=""/>
-            </a:pPr>
-            <a:r>
-              <a:rPr b="0" lang="en-CA" sz="3200" spc="-1" strike="noStrike">
+              <a:rPr lang="en-CA" sz="3200" b="0" strike="noStrike" spc="-1">
                 <a:latin typeface="Arial"/>
               </a:rPr>
               <a:t>If these two steps can be completed, and there is still enough data with enough features to build an accurate model, then a model can be build and deployed. If a model is deployed, it should be accompanied by a Consumer Financial Protection Bureau program to handle complaints of algorithmic bias.</a:t>
             </a:r>
-            <a:endParaRPr b="0" lang="en-CA" sz="3200" spc="-1" strike="noStrike">
-              <a:latin typeface="Arial"/>
-            </a:endParaRPr>
           </a:p>
         </p:txBody>
       </p:sp>
     </p:spTree>
   </p:cSld>
-  <mc:AlternateContent>
-    <mc:Choice Requires="p14">
-      <p:transition spd="slow" p14:dur="2000"/>
-    </mc:Choice>
-    <mc:Fallback>
-      <p:transition spd="slow"/>
-    </mc:Fallback>
-  </mc:AlternateContent>
+  <p:clrMapOvr>
+    <a:masterClrMapping/>
+  </p:clrMapOvr>
 </p:sld>
 </file>
 
@@ -3591,31 +3862,31 @@
         <a:sysClr val="window" lastClr="FFFFFF"/>
       </a:lt1>
       <a:dk2>
-        <a:srgbClr val="1f497d"/>
+        <a:srgbClr val="1F497D"/>
       </a:dk2>
       <a:lt2>
-        <a:srgbClr val="eeece1"/>
+        <a:srgbClr val="EEECE1"/>
       </a:lt2>
       <a:accent1>
-        <a:srgbClr val="4f81bd"/>
+        <a:srgbClr val="4F81BD"/>
       </a:accent1>
       <a:accent2>
-        <a:srgbClr val="c0504d"/>
+        <a:srgbClr val="C0504D"/>
       </a:accent2>
       <a:accent3>
-        <a:srgbClr val="9bbb59"/>
+        <a:srgbClr val="9BBB59"/>
       </a:accent3>
       <a:accent4>
-        <a:srgbClr val="8064a2"/>
+        <a:srgbClr val="8064A2"/>
       </a:accent4>
       <a:accent5>
-        <a:srgbClr val="4bacc6"/>
+        <a:srgbClr val="4BACC6"/>
       </a:accent5>
       <a:accent6>
-        <a:srgbClr val="f79646"/>
+        <a:srgbClr val="F79646"/>
       </a:accent6>
       <a:hlink>
-        <a:srgbClr val="0000ff"/>
+        <a:srgbClr val="0000FF"/>
       </a:hlink>
       <a:folHlink>
         <a:srgbClr val="800080"/>
@@ -3803,5 +4074,7 @@
       </a:bgFillStyleLst>
     </a:fmtScheme>
   </a:themeElements>
+  <a:objectDefaults/>
+  <a:extraClrSchemeLst/>
 </a:theme>
 </file>
</xml_diff>